<commit_message>
Tabular layout for elixir overview
</commit_message>
<xml_diff>
--- a/elixir.pptx
+++ b/elixir.pptx
@@ -5287,417 +5287,6 @@
           </a:p>
         </p:txBody>
       </p:sp>
-      <p:sp>
-        <p:nvSpPr>
-          <p:cNvPr id="4" name="TextBox 3"/>
-          <p:cNvSpPr txBox="1"/>
-          <p:nvPr/>
-        </p:nvSpPr>
-        <p:spPr>
-          <a:xfrm>
-            <a:off x="1316160" y="1717694"/>
-            <a:ext cx="8092770" cy="3616972"/>
-          </a:xfrm>
-          <a:prstGeom prst="rect">
-            <a:avLst/>
-          </a:prstGeom>
-          <a:noFill/>
-          <a:ln>
-            <a:noFill/>
-          </a:ln>
-        </p:spPr>
-        <p:txBody>
-          <a:bodyPr vert="horz" wrap="none" lIns="90000" tIns="45000" rIns="90000" bIns="45000" anchorCtr="0" compatLnSpc="0">
-            <a:spAutoFit/>
-          </a:bodyPr>
-          <a:lstStyle/>
-          <a:p>
-            <a:pPr hangingPunct="0">
-              <a:lnSpc>
-                <a:spcPct val="150000"/>
-              </a:lnSpc>
-              <a:spcBef>
-                <a:spcPts val="575"/>
-              </a:spcBef>
-              <a:spcAft>
-                <a:spcPts val="575"/>
-              </a:spcAft>
-            </a:pPr>
-            <a:r>
-              <a:rPr lang="pl-PL" sz="2400" b="1" i="0" u="none" strike="noStrike" kern="1200" cap="none" dirty="0" smtClean="0">
-                <a:ln>
-                  <a:noFill/>
-                </a:ln>
-                <a:solidFill>
-                  <a:schemeClr val="tx1">
-                    <a:lumMod val="75000"/>
-                    <a:lumOff val="25000"/>
-                  </a:schemeClr>
-                </a:solidFill>
-                <a:latin typeface="Lovelo Black" pitchFamily="18"/>
-                <a:ea typeface="Droid Sans Fallback" pitchFamily="2"/>
-                <a:cs typeface="FreeSans" pitchFamily="2"/>
-              </a:rPr>
-              <a:t>TWÓrca</a:t>
-            </a:r>
-            <a:r>
-              <a:rPr lang="pl-PL" sz="2400" b="1" i="0" u="none" strike="noStrike" kern="1200" cap="none" dirty="0" smtClean="0">
-                <a:ln>
-                  <a:noFill/>
-                </a:ln>
-                <a:solidFill>
-                  <a:schemeClr val="tx1">
-                    <a:lumMod val="75000"/>
-                    <a:lumOff val="25000"/>
-                  </a:schemeClr>
-                </a:solidFill>
-                <a:latin typeface="Lovelo Black" pitchFamily="18"/>
-                <a:ea typeface="Droid Sans Fallback" pitchFamily="2"/>
-                <a:cs typeface="FreeSans" pitchFamily="2"/>
-              </a:rPr>
-              <a:t>:		</a:t>
-            </a:r>
-            <a:r>
-              <a:rPr lang="pl-PL" sz="2400" b="1" i="0" u="none" strike="noStrike" kern="1200" cap="none" dirty="0" smtClean="0">
-                <a:ln>
-                  <a:noFill/>
-                </a:ln>
-                <a:solidFill>
-                  <a:schemeClr val="tx1">
-                    <a:lumMod val="75000"/>
-                    <a:lumOff val="25000"/>
-                  </a:schemeClr>
-                </a:solidFill>
-                <a:latin typeface="Lovelo Black" pitchFamily="18"/>
-                <a:ea typeface="Droid Sans Fallback" pitchFamily="2"/>
-                <a:cs typeface="FreeSans" pitchFamily="2"/>
-              </a:rPr>
-              <a:t>			</a:t>
-            </a:r>
-            <a:r>
-              <a:rPr lang="pl-PL" sz="2400" dirty="0" smtClean="0">
-                <a:solidFill>
-                  <a:schemeClr val="bg2">
-                    <a:lumMod val="50000"/>
-                  </a:schemeClr>
-                </a:solidFill>
-                <a:latin typeface="Bitter" panose="00000500000000000000" pitchFamily="50" charset="-18"/>
-              </a:rPr>
-              <a:t>José </a:t>
-            </a:r>
-            <a:r>
-              <a:rPr lang="pl-PL" sz="2400" dirty="0" smtClean="0">
-                <a:solidFill>
-                  <a:schemeClr val="bg2">
-                    <a:lumMod val="50000"/>
-                  </a:schemeClr>
-                </a:solidFill>
-                <a:latin typeface="Bitter" panose="00000500000000000000" pitchFamily="50" charset="-18"/>
-              </a:rPr>
-              <a:t>Valim</a:t>
-            </a:r>
-            <a:endParaRPr lang="pl-PL" sz="2400" b="1" u="none" strike="noStrike" kern="1200" cap="none" dirty="0" smtClean="0">
-              <a:ln>
-                <a:noFill/>
-              </a:ln>
-              <a:solidFill>
-                <a:schemeClr val="tx1">
-                  <a:lumMod val="75000"/>
-                  <a:lumOff val="25000"/>
-                </a:schemeClr>
-              </a:solidFill>
-              <a:latin typeface="Lovelo Black" pitchFamily="18"/>
-              <a:ea typeface="Droid Sans Fallback" pitchFamily="2"/>
-              <a:cs typeface="FreeSans" pitchFamily="2"/>
-            </a:endParaRPr>
-          </a:p>
-          <a:p>
-            <a:pPr marL="0" marR="0" lvl="0" indent="0" rtl="0" hangingPunct="0">
-              <a:lnSpc>
-                <a:spcPct val="150000"/>
-              </a:lnSpc>
-              <a:spcBef>
-                <a:spcPts val="575"/>
-              </a:spcBef>
-              <a:spcAft>
-                <a:spcPts val="575"/>
-              </a:spcAft>
-              <a:buNone/>
-              <a:tabLst/>
-            </a:pPr>
-            <a:r>
-              <a:rPr lang="en-US" sz="2400" b="1" i="0" u="none" strike="noStrike" kern="1200" cap="none" dirty="0" err="1" smtClean="0">
-                <a:ln>
-                  <a:noFill/>
-                </a:ln>
-                <a:solidFill>
-                  <a:schemeClr val="tx1">
-                    <a:lumMod val="75000"/>
-                    <a:lumOff val="25000"/>
-                  </a:schemeClr>
-                </a:solidFill>
-                <a:latin typeface="Lovelo Black" pitchFamily="18"/>
-                <a:ea typeface="Droid Sans Fallback" pitchFamily="2"/>
-                <a:cs typeface="FreeSans" pitchFamily="2"/>
-              </a:rPr>
-              <a:t>Licencja</a:t>
-            </a:r>
-            <a:r>
-              <a:rPr lang="en-US" sz="2400" b="1" i="0" u="none" strike="noStrike" kern="1200" cap="none" dirty="0" smtClean="0">
-                <a:ln>
-                  <a:noFill/>
-                </a:ln>
-                <a:solidFill>
-                  <a:srgbClr val="666666"/>
-                </a:solidFill>
-                <a:latin typeface="Lovelo Black" pitchFamily="18"/>
-                <a:ea typeface="Droid Sans Fallback" pitchFamily="2"/>
-                <a:cs typeface="FreeSans" pitchFamily="2"/>
-              </a:rPr>
-              <a:t>:</a:t>
-            </a:r>
-            <a:r>
-              <a:rPr lang="pl-PL" sz="2400" b="1" i="0" u="none" strike="noStrike" kern="1200" cap="none" dirty="0" smtClean="0">
-                <a:ln>
-                  <a:noFill/>
-                </a:ln>
-                <a:solidFill>
-                  <a:srgbClr val="666666"/>
-                </a:solidFill>
-                <a:latin typeface="Lovelo Black" pitchFamily="18"/>
-                <a:ea typeface="Droid Sans Fallback" pitchFamily="2"/>
-                <a:cs typeface="FreeSans" pitchFamily="2"/>
-              </a:rPr>
-              <a:t> 		</a:t>
-            </a:r>
-            <a:r>
-              <a:rPr lang="pl-PL" sz="2400" b="1" i="0" u="none" strike="noStrike" kern="1200" cap="none" dirty="0" smtClean="0">
-                <a:ln>
-                  <a:noFill/>
-                </a:ln>
-                <a:solidFill>
-                  <a:srgbClr val="666666"/>
-                </a:solidFill>
-                <a:latin typeface="Lovelo Black" pitchFamily="18"/>
-                <a:ea typeface="Droid Sans Fallback" pitchFamily="2"/>
-                <a:cs typeface="FreeSans" pitchFamily="2"/>
-              </a:rPr>
-              <a:t>		 </a:t>
-            </a:r>
-            <a:r>
-              <a:rPr lang="en-US" sz="2400" i="0" u="none" strike="noStrike" kern="1200" cap="none" dirty="0" smtClean="0">
-                <a:ln>
-                  <a:noFill/>
-                </a:ln>
-                <a:solidFill>
-                  <a:schemeClr val="bg2">
-                    <a:lumMod val="50000"/>
-                  </a:schemeClr>
-                </a:solidFill>
-                <a:latin typeface="Bitter" panose="00000500000000000000" pitchFamily="50" charset="-18"/>
-                <a:ea typeface="Droid Sans Fallback" pitchFamily="2"/>
-                <a:cs typeface="FreeSans" pitchFamily="2"/>
-              </a:rPr>
-              <a:t>APACHE License</a:t>
-            </a:r>
-            <a:endParaRPr lang="pl-PL" sz="2400" i="0" u="none" strike="noStrike" kern="1200" cap="none" dirty="0" smtClean="0">
-              <a:ln>
-                <a:noFill/>
-              </a:ln>
-              <a:solidFill>
-                <a:schemeClr val="bg2">
-                  <a:lumMod val="50000"/>
-                </a:schemeClr>
-              </a:solidFill>
-              <a:latin typeface="Bitter" panose="00000500000000000000" pitchFamily="50" charset="-18"/>
-              <a:ea typeface="Droid Sans Fallback" pitchFamily="2"/>
-              <a:cs typeface="FreeSans" pitchFamily="2"/>
-            </a:endParaRPr>
-          </a:p>
-          <a:p>
-            <a:pPr lvl="0" hangingPunct="0">
-              <a:lnSpc>
-                <a:spcPct val="150000"/>
-              </a:lnSpc>
-              <a:spcBef>
-                <a:spcPts val="575"/>
-              </a:spcBef>
-              <a:spcAft>
-                <a:spcPts val="575"/>
-              </a:spcAft>
-            </a:pPr>
-            <a:r>
-              <a:rPr lang="pl-PL" sz="2400" b="1" dirty="0" smtClean="0">
-                <a:solidFill>
-                  <a:schemeClr val="tx1">
-                    <a:lumMod val="75000"/>
-                    <a:lumOff val="25000"/>
-                  </a:schemeClr>
-                </a:solidFill>
-                <a:latin typeface="Lovelo Black" pitchFamily="18"/>
-                <a:ea typeface="Droid Sans Fallback" pitchFamily="2"/>
-                <a:cs typeface="FreeSans" pitchFamily="2"/>
-              </a:rPr>
-              <a:t>Historia</a:t>
-            </a:r>
-            <a:r>
-              <a:rPr lang="en-US" sz="2400" b="1" dirty="0" smtClean="0">
-                <a:solidFill>
-                  <a:srgbClr val="666666"/>
-                </a:solidFill>
-                <a:latin typeface="Lovelo Black" pitchFamily="18"/>
-                <a:ea typeface="Droid Sans Fallback" pitchFamily="2"/>
-                <a:cs typeface="FreeSans" pitchFamily="2"/>
-              </a:rPr>
-              <a:t>:</a:t>
-            </a:r>
-            <a:r>
-              <a:rPr lang="pl-PL" sz="2400" b="1" dirty="0" smtClean="0">
-                <a:solidFill>
-                  <a:srgbClr val="666666"/>
-                </a:solidFill>
-                <a:latin typeface="Lovelo Black" pitchFamily="18"/>
-                <a:ea typeface="Droid Sans Fallback" pitchFamily="2"/>
-                <a:cs typeface="FreeSans" pitchFamily="2"/>
-              </a:rPr>
-              <a:t>				       </a:t>
-            </a:r>
-            <a:r>
-              <a:rPr lang="pl-PL" sz="2400" dirty="0" smtClean="0">
-                <a:solidFill>
-                  <a:srgbClr val="666666"/>
-                </a:solidFill>
-                <a:latin typeface="Bitter" panose="00000500000000000000" pitchFamily="50" charset="-18"/>
-                <a:ea typeface="Droid Sans Fallback" pitchFamily="2"/>
-                <a:cs typeface="FreeSans" pitchFamily="2"/>
-              </a:rPr>
-              <a:t>2012: v.0.0.0</a:t>
-            </a:r>
-            <a:r>
-              <a:rPr lang="pl-PL" sz="2400" b="1" dirty="0" smtClean="0">
-                <a:solidFill>
-                  <a:srgbClr val="666666"/>
-                </a:solidFill>
-                <a:latin typeface="Lovelo Black" pitchFamily="18"/>
-                <a:ea typeface="Droid Sans Fallback" pitchFamily="2"/>
-                <a:cs typeface="FreeSans" pitchFamily="2"/>
-              </a:rPr>
-              <a:t>	      </a:t>
-            </a:r>
-          </a:p>
-          <a:p>
-            <a:pPr lvl="0" hangingPunct="0">
-              <a:lnSpc>
-                <a:spcPct val="150000"/>
-              </a:lnSpc>
-              <a:spcBef>
-                <a:spcPts val="575"/>
-              </a:spcBef>
-              <a:spcAft>
-                <a:spcPts val="575"/>
-              </a:spcAft>
-            </a:pPr>
-            <a:r>
-              <a:rPr lang="pl-PL" sz="2400" b="1" dirty="0">
-                <a:solidFill>
-                  <a:srgbClr val="666666"/>
-                </a:solidFill>
-                <a:latin typeface="Lovelo Black" pitchFamily="18"/>
-                <a:ea typeface="Droid Sans Fallback" pitchFamily="2"/>
-                <a:cs typeface="FreeSans" pitchFamily="2"/>
-              </a:rPr>
-              <a:t>	</a:t>
-            </a:r>
-            <a:r>
-              <a:rPr lang="pl-PL" sz="2400" b="1" dirty="0" smtClean="0">
-                <a:solidFill>
-                  <a:srgbClr val="666666"/>
-                </a:solidFill>
-                <a:latin typeface="Lovelo Black" pitchFamily="18"/>
-                <a:ea typeface="Droid Sans Fallback" pitchFamily="2"/>
-                <a:cs typeface="FreeSans" pitchFamily="2"/>
-              </a:rPr>
-              <a:t>				       </a:t>
-            </a:r>
-            <a:r>
-              <a:rPr lang="pl-PL" sz="2400" dirty="0" smtClean="0">
-                <a:solidFill>
-                  <a:srgbClr val="666666"/>
-                </a:solidFill>
-                <a:latin typeface="Bitter" panose="00000500000000000000" pitchFamily="50" charset="-18"/>
-                <a:ea typeface="Droid Sans Fallback" pitchFamily="2"/>
-                <a:cs typeface="FreeSans" pitchFamily="2"/>
-              </a:rPr>
-              <a:t>2014:</a:t>
-            </a:r>
-            <a:r>
-              <a:rPr lang="pl-PL" sz="2400" b="1" dirty="0">
-                <a:solidFill>
-                  <a:srgbClr val="666666"/>
-                </a:solidFill>
-                <a:latin typeface="Lovelo Black" pitchFamily="18"/>
-                <a:ea typeface="Droid Sans Fallback" pitchFamily="2"/>
-                <a:cs typeface="FreeSans" pitchFamily="2"/>
-              </a:rPr>
-              <a:t> </a:t>
-            </a:r>
-            <a:r>
-              <a:rPr lang="pl-PL" sz="2400" dirty="0" smtClean="0">
-                <a:solidFill>
-                  <a:schemeClr val="bg2">
-                    <a:lumMod val="50000"/>
-                  </a:schemeClr>
-                </a:solidFill>
-                <a:latin typeface="Bitter" panose="00000500000000000000" pitchFamily="50" charset="-18"/>
-                <a:ea typeface="Droid Sans Fallback" pitchFamily="2"/>
-                <a:cs typeface="FreeSans" pitchFamily="2"/>
-              </a:rPr>
-              <a:t>v.1.0.0</a:t>
-            </a:r>
-            <a:endParaRPr lang="pl-PL" sz="2400" i="0" u="none" strike="noStrike" kern="1200" cap="none" dirty="0" smtClean="0">
-              <a:ln>
-                <a:noFill/>
-              </a:ln>
-              <a:solidFill>
-                <a:schemeClr val="bg2">
-                  <a:lumMod val="50000"/>
-                </a:schemeClr>
-              </a:solidFill>
-              <a:latin typeface="Bitter" panose="00000500000000000000" pitchFamily="50" charset="-18"/>
-              <a:ea typeface="Droid Sans Fallback" pitchFamily="2"/>
-              <a:cs typeface="FreeSans" pitchFamily="2"/>
-            </a:endParaRPr>
-          </a:p>
-          <a:p>
-            <a:pPr marL="0" marR="0" lvl="0" indent="0" rtl="0" hangingPunct="0">
-              <a:lnSpc>
-                <a:spcPct val="150000"/>
-              </a:lnSpc>
-              <a:spcBef>
-                <a:spcPts val="575"/>
-              </a:spcBef>
-              <a:spcAft>
-                <a:spcPts val="575"/>
-              </a:spcAft>
-              <a:buNone/>
-              <a:tabLst/>
-            </a:pPr>
-            <a:endParaRPr lang="en-US" sz="2400" i="0" u="none" strike="noStrike" kern="1200" cap="none" dirty="0">
-              <a:ln>
-                <a:noFill/>
-              </a:ln>
-              <a:solidFill>
-                <a:schemeClr val="bg2">
-                  <a:lumMod val="50000"/>
-                </a:schemeClr>
-              </a:solidFill>
-              <a:latin typeface="Bitter" panose="00000500000000000000" pitchFamily="50" charset="-18"/>
-              <a:ea typeface="Droid Sans Fallback" pitchFamily="2"/>
-              <a:cs typeface="FreeSans" pitchFamily="2"/>
-            </a:endParaRPr>
-          </a:p>
-        </p:txBody>
-      </p:sp>
       <p:pic>
         <p:nvPicPr>
           <p:cNvPr id="5" name="Picture 4"/>
@@ -5718,7 +5307,7 @@
         </p:blipFill>
         <p:spPr>
           <a:xfrm>
-            <a:off x="5101560" y="3826079"/>
+            <a:off x="5219547" y="4298028"/>
             <a:ext cx="360" cy="360"/>
           </a:xfrm>
           <a:prstGeom prst="rect">
@@ -5750,7 +5339,7 @@
         </p:blipFill>
         <p:spPr>
           <a:xfrm>
-            <a:off x="5101560" y="3615120"/>
+            <a:off x="5219547" y="4087069"/>
             <a:ext cx="360" cy="360"/>
           </a:xfrm>
           <a:prstGeom prst="rect">
@@ -5804,6 +5393,603 @@
           </a:ln>
         </p:spPr>
       </p:pic>
+      <p:graphicFrame>
+        <p:nvGraphicFramePr>
+          <p:cNvPr id="3" name="Table 2"/>
+          <p:cNvGraphicFramePr>
+            <a:graphicFrameLocks noGrp="1"/>
+          </p:cNvGraphicFramePr>
+          <p:nvPr>
+            <p:extLst>
+              <p:ext uri="{D42A27DB-BD31-4B8C-83A1-F6EECF244321}">
+                <p14:modId xmlns:p14="http://schemas.microsoft.com/office/powerpoint/2010/main" val="1861588431"/>
+              </p:ext>
+            </p:extLst>
+          </p:nvPr>
+        </p:nvGraphicFramePr>
+        <p:xfrm>
+          <a:off x="1622323" y="2261421"/>
+          <a:ext cx="7393856" cy="3414600"/>
+        </p:xfrm>
+        <a:graphic>
+          <a:graphicData uri="http://schemas.openxmlformats.org/drawingml/2006/table">
+            <a:tbl>
+              <a:tblPr firstRow="1" bandRow="1">
+                <a:tableStyleId>{5C22544A-7EE6-4342-B048-85BDC9FD1C3A}</a:tableStyleId>
+              </a:tblPr>
+              <a:tblGrid>
+                <a:gridCol w="4581832"/>
+                <a:gridCol w="2812024"/>
+              </a:tblGrid>
+              <a:tr h="838158">
+                <a:tc>
+                  <a:txBody>
+                    <a:bodyPr/>
+                    <a:lstStyle/>
+                    <a:p>
+                      <a:r>
+                        <a:rPr lang="pl-PL" sz="2400" b="1" i="0" u="none" strike="noStrike" kern="1200" cap="none" dirty="0" smtClean="0">
+                          <a:ln>
+                            <a:noFill/>
+                          </a:ln>
+                          <a:solidFill>
+                            <a:schemeClr val="tx1">
+                              <a:lumMod val="75000"/>
+                              <a:lumOff val="25000"/>
+                            </a:schemeClr>
+                          </a:solidFill>
+                          <a:latin typeface="Lovelo Black" pitchFamily="18"/>
+                          <a:ea typeface="Droid Sans Fallback" pitchFamily="2"/>
+                          <a:cs typeface="FreeSans" pitchFamily="2"/>
+                        </a:rPr>
+                        <a:t>TWÓrca:</a:t>
+                      </a:r>
+                      <a:endParaRPr lang="pl-PL" sz="2400" dirty="0"/>
+                    </a:p>
+                  </a:txBody>
+                  <a:tcPr>
+                    <a:lnL w="12700" cap="flat" cmpd="sng" algn="ctr">
+                      <a:noFill/>
+                      <a:prstDash val="solid"/>
+                      <a:round/>
+                      <a:headEnd type="none" w="med" len="med"/>
+                      <a:tailEnd type="none" w="med" len="med"/>
+                    </a:lnL>
+                    <a:lnR w="12700" cap="flat" cmpd="sng" algn="ctr">
+                      <a:noFill/>
+                      <a:prstDash val="solid"/>
+                      <a:round/>
+                      <a:headEnd type="none" w="med" len="med"/>
+                      <a:tailEnd type="none" w="med" len="med"/>
+                    </a:lnR>
+                    <a:lnT w="12700" cap="flat" cmpd="sng" algn="ctr">
+                      <a:noFill/>
+                      <a:prstDash val="solid"/>
+                      <a:round/>
+                      <a:headEnd type="none" w="med" len="med"/>
+                      <a:tailEnd type="none" w="med" len="med"/>
+                    </a:lnT>
+                    <a:lnB w="12700" cap="flat" cmpd="sng" algn="ctr">
+                      <a:noFill/>
+                      <a:prstDash val="solid"/>
+                      <a:round/>
+                      <a:headEnd type="none" w="med" len="med"/>
+                      <a:tailEnd type="none" w="med" len="med"/>
+                    </a:lnB>
+                    <a:lnTlToBr w="12700" cmpd="sng">
+                      <a:noFill/>
+                      <a:prstDash val="solid"/>
+                    </a:lnTlToBr>
+                    <a:lnBlToTr w="12700" cmpd="sng">
+                      <a:noFill/>
+                      <a:prstDash val="solid"/>
+                    </a:lnBlToTr>
+                    <a:noFill/>
+                  </a:tcPr>
+                </a:tc>
+                <a:tc>
+                  <a:txBody>
+                    <a:bodyPr/>
+                    <a:lstStyle/>
+                    <a:p>
+                      <a:pPr marL="0" marR="0" indent="0" algn="l" defTabSz="914400" rtl="0" eaLnBrk="1" fontAlgn="auto" latinLnBrk="0" hangingPunct="1">
+                        <a:lnSpc>
+                          <a:spcPct val="100000"/>
+                        </a:lnSpc>
+                        <a:spcBef>
+                          <a:spcPts val="0"/>
+                        </a:spcBef>
+                        <a:spcAft>
+                          <a:spcPts val="0"/>
+                        </a:spcAft>
+                        <a:buClrTx/>
+                        <a:buSzTx/>
+                        <a:buFontTx/>
+                        <a:buNone/>
+                        <a:tabLst/>
+                        <a:defRPr/>
+                      </a:pPr>
+                      <a:r>
+                        <a:rPr lang="pl-PL" sz="2400" b="0" dirty="0" smtClean="0">
+                          <a:solidFill>
+                            <a:schemeClr val="bg2">
+                              <a:lumMod val="50000"/>
+                            </a:schemeClr>
+                          </a:solidFill>
+                          <a:latin typeface="Bitter" panose="00000500000000000000" pitchFamily="50" charset="-18"/>
+                        </a:rPr>
+                        <a:t>José Valim</a:t>
+                      </a:r>
+                      <a:endParaRPr lang="pl-PL" sz="2400" b="0" u="none" strike="noStrike" kern="1200" cap="none" dirty="0" smtClean="0">
+                        <a:ln>
+                          <a:noFill/>
+                        </a:ln>
+                        <a:solidFill>
+                          <a:schemeClr val="tx1">
+                            <a:lumMod val="75000"/>
+                            <a:lumOff val="25000"/>
+                          </a:schemeClr>
+                        </a:solidFill>
+                        <a:latin typeface="Lovelo Black" pitchFamily="18"/>
+                        <a:ea typeface="Droid Sans Fallback" pitchFamily="2"/>
+                        <a:cs typeface="FreeSans" pitchFamily="2"/>
+                      </a:endParaRPr>
+                    </a:p>
+                    <a:p>
+                      <a:pPr algn="l"/>
+                      <a:endParaRPr lang="pl-PL" sz="2400" dirty="0"/>
+                    </a:p>
+                  </a:txBody>
+                  <a:tcPr>
+                    <a:lnL w="12700" cap="flat" cmpd="sng" algn="ctr">
+                      <a:noFill/>
+                      <a:prstDash val="solid"/>
+                      <a:round/>
+                      <a:headEnd type="none" w="med" len="med"/>
+                      <a:tailEnd type="none" w="med" len="med"/>
+                    </a:lnL>
+                    <a:lnR w="12700" cap="flat" cmpd="sng" algn="ctr">
+                      <a:noFill/>
+                      <a:prstDash val="solid"/>
+                      <a:round/>
+                      <a:headEnd type="none" w="med" len="med"/>
+                      <a:tailEnd type="none" w="med" len="med"/>
+                    </a:lnR>
+                    <a:lnT w="12700" cap="flat" cmpd="sng" algn="ctr">
+                      <a:noFill/>
+                      <a:prstDash val="solid"/>
+                      <a:round/>
+                      <a:headEnd type="none" w="med" len="med"/>
+                      <a:tailEnd type="none" w="med" len="med"/>
+                    </a:lnT>
+                    <a:lnB w="12700" cap="flat" cmpd="sng" algn="ctr">
+                      <a:noFill/>
+                      <a:prstDash val="solid"/>
+                      <a:round/>
+                      <a:headEnd type="none" w="med" len="med"/>
+                      <a:tailEnd type="none" w="med" len="med"/>
+                    </a:lnB>
+                    <a:lnTlToBr w="12700" cmpd="sng">
+                      <a:noFill/>
+                      <a:prstDash val="solid"/>
+                    </a:lnTlToBr>
+                    <a:lnBlToTr w="12700" cmpd="sng">
+                      <a:noFill/>
+                      <a:prstDash val="solid"/>
+                    </a:lnBlToTr>
+                    <a:noFill/>
+                  </a:tcPr>
+                </a:tc>
+              </a:tr>
+              <a:tr h="902152">
+                <a:tc>
+                  <a:txBody>
+                    <a:bodyPr/>
+                    <a:lstStyle/>
+                    <a:p>
+                      <a:r>
+                        <a:rPr lang="en-US" sz="2400" b="1" i="0" u="none" strike="noStrike" kern="1200" cap="none" dirty="0" err="1" smtClean="0">
+                          <a:ln>
+                            <a:noFill/>
+                          </a:ln>
+                          <a:solidFill>
+                            <a:schemeClr val="tx1">
+                              <a:lumMod val="75000"/>
+                              <a:lumOff val="25000"/>
+                            </a:schemeClr>
+                          </a:solidFill>
+                          <a:latin typeface="Lovelo Black" pitchFamily="18"/>
+                          <a:ea typeface="Droid Sans Fallback" pitchFamily="2"/>
+                          <a:cs typeface="FreeSans" pitchFamily="2"/>
+                        </a:rPr>
+                        <a:t>Licencja</a:t>
+                      </a:r>
+                      <a:r>
+                        <a:rPr lang="en-US" sz="2400" b="1" i="0" u="none" strike="noStrike" kern="1200" cap="none" dirty="0" smtClean="0">
+                          <a:ln>
+                            <a:noFill/>
+                          </a:ln>
+                          <a:solidFill>
+                            <a:srgbClr val="666666"/>
+                          </a:solidFill>
+                          <a:latin typeface="Lovelo Black" pitchFamily="18"/>
+                          <a:ea typeface="Droid Sans Fallback" pitchFamily="2"/>
+                          <a:cs typeface="FreeSans" pitchFamily="2"/>
+                        </a:rPr>
+                        <a:t>:</a:t>
+                      </a:r>
+                      <a:endParaRPr lang="pl-PL" sz="2400" dirty="0"/>
+                    </a:p>
+                  </a:txBody>
+                  <a:tcPr>
+                    <a:lnL w="12700" cap="flat" cmpd="sng" algn="ctr">
+                      <a:noFill/>
+                      <a:prstDash val="solid"/>
+                      <a:round/>
+                      <a:headEnd type="none" w="med" len="med"/>
+                      <a:tailEnd type="none" w="med" len="med"/>
+                    </a:lnL>
+                    <a:lnR w="12700" cap="flat" cmpd="sng" algn="ctr">
+                      <a:noFill/>
+                      <a:prstDash val="solid"/>
+                      <a:round/>
+                      <a:headEnd type="none" w="med" len="med"/>
+                      <a:tailEnd type="none" w="med" len="med"/>
+                    </a:lnR>
+                    <a:lnT w="12700" cap="flat" cmpd="sng" algn="ctr">
+                      <a:noFill/>
+                      <a:prstDash val="solid"/>
+                      <a:round/>
+                      <a:headEnd type="none" w="med" len="med"/>
+                      <a:tailEnd type="none" w="med" len="med"/>
+                    </a:lnT>
+                    <a:lnB w="12700" cap="flat" cmpd="sng" algn="ctr">
+                      <a:noFill/>
+                      <a:prstDash val="solid"/>
+                      <a:round/>
+                      <a:headEnd type="none" w="med" len="med"/>
+                      <a:tailEnd type="none" w="med" len="med"/>
+                    </a:lnB>
+                    <a:lnTlToBr w="12700" cmpd="sng">
+                      <a:noFill/>
+                      <a:prstDash val="solid"/>
+                    </a:lnTlToBr>
+                    <a:lnBlToTr w="12700" cmpd="sng">
+                      <a:noFill/>
+                      <a:prstDash val="solid"/>
+                    </a:lnBlToTr>
+                    <a:noFill/>
+                  </a:tcPr>
+                </a:tc>
+                <a:tc>
+                  <a:txBody>
+                    <a:bodyPr/>
+                    <a:lstStyle/>
+                    <a:p>
+                      <a:pPr marL="0" marR="0" indent="0" algn="l" defTabSz="914400" rtl="0" eaLnBrk="1" fontAlgn="auto" latinLnBrk="0" hangingPunct="1">
+                        <a:lnSpc>
+                          <a:spcPct val="100000"/>
+                        </a:lnSpc>
+                        <a:spcBef>
+                          <a:spcPts val="0"/>
+                        </a:spcBef>
+                        <a:spcAft>
+                          <a:spcPts val="0"/>
+                        </a:spcAft>
+                        <a:buClrTx/>
+                        <a:buSzTx/>
+                        <a:buFontTx/>
+                        <a:buNone/>
+                        <a:tabLst/>
+                        <a:defRPr/>
+                      </a:pPr>
+                      <a:r>
+                        <a:rPr lang="en-US" sz="2400" i="0" u="none" strike="noStrike" kern="1200" cap="none" dirty="0" smtClean="0">
+                          <a:ln>
+                            <a:noFill/>
+                          </a:ln>
+                          <a:solidFill>
+                            <a:schemeClr val="bg2">
+                              <a:lumMod val="50000"/>
+                            </a:schemeClr>
+                          </a:solidFill>
+                          <a:latin typeface="Bitter" panose="00000500000000000000" pitchFamily="50" charset="-18"/>
+                          <a:ea typeface="Droid Sans Fallback" pitchFamily="2"/>
+                          <a:cs typeface="FreeSans" pitchFamily="2"/>
+                        </a:rPr>
+                        <a:t>APACHE License</a:t>
+                      </a:r>
+                      <a:endParaRPr lang="pl-PL" sz="2400" i="0" u="none" strike="noStrike" kern="1200" cap="none" dirty="0" smtClean="0">
+                        <a:ln>
+                          <a:noFill/>
+                        </a:ln>
+                        <a:solidFill>
+                          <a:schemeClr val="bg2">
+                            <a:lumMod val="50000"/>
+                          </a:schemeClr>
+                        </a:solidFill>
+                        <a:latin typeface="Bitter" panose="00000500000000000000" pitchFamily="50" charset="-18"/>
+                        <a:ea typeface="Droid Sans Fallback" pitchFamily="2"/>
+                        <a:cs typeface="FreeSans" pitchFamily="2"/>
+                      </a:endParaRPr>
+                    </a:p>
+                    <a:p>
+                      <a:pPr algn="l"/>
+                      <a:endParaRPr lang="pl-PL" sz="2400" dirty="0"/>
+                    </a:p>
+                  </a:txBody>
+                  <a:tcPr>
+                    <a:lnL w="12700" cap="flat" cmpd="sng" algn="ctr">
+                      <a:noFill/>
+                      <a:prstDash val="solid"/>
+                      <a:round/>
+                      <a:headEnd type="none" w="med" len="med"/>
+                      <a:tailEnd type="none" w="med" len="med"/>
+                    </a:lnL>
+                    <a:lnR w="12700" cap="flat" cmpd="sng" algn="ctr">
+                      <a:noFill/>
+                      <a:prstDash val="solid"/>
+                      <a:round/>
+                      <a:headEnd type="none" w="med" len="med"/>
+                      <a:tailEnd type="none" w="med" len="med"/>
+                    </a:lnR>
+                    <a:lnT w="12700" cap="flat" cmpd="sng" algn="ctr">
+                      <a:noFill/>
+                      <a:prstDash val="solid"/>
+                      <a:round/>
+                      <a:headEnd type="none" w="med" len="med"/>
+                      <a:tailEnd type="none" w="med" len="med"/>
+                    </a:lnT>
+                    <a:lnB w="12700" cap="flat" cmpd="sng" algn="ctr">
+                      <a:noFill/>
+                      <a:prstDash val="solid"/>
+                      <a:round/>
+                      <a:headEnd type="none" w="med" len="med"/>
+                      <a:tailEnd type="none" w="med" len="med"/>
+                    </a:lnB>
+                    <a:lnTlToBr w="12700" cmpd="sng">
+                      <a:noFill/>
+                      <a:prstDash val="solid"/>
+                    </a:lnTlToBr>
+                    <a:lnBlToTr w="12700" cmpd="sng">
+                      <a:noFill/>
+                      <a:prstDash val="solid"/>
+                    </a:lnBlToTr>
+                    <a:noFill/>
+                  </a:tcPr>
+                </a:tc>
+              </a:tr>
+              <a:tr h="1674290">
+                <a:tc>
+                  <a:txBody>
+                    <a:bodyPr/>
+                    <a:lstStyle/>
+                    <a:p>
+                      <a:r>
+                        <a:rPr lang="pl-PL" sz="2400" b="1" dirty="0" smtClean="0">
+                          <a:solidFill>
+                            <a:schemeClr val="tx1">
+                              <a:lumMod val="75000"/>
+                              <a:lumOff val="25000"/>
+                            </a:schemeClr>
+                          </a:solidFill>
+                          <a:latin typeface="Lovelo Black" pitchFamily="18"/>
+                          <a:ea typeface="Droid Sans Fallback" pitchFamily="2"/>
+                          <a:cs typeface="FreeSans" pitchFamily="2"/>
+                        </a:rPr>
+                        <a:t>Historia</a:t>
+                      </a:r>
+                      <a:r>
+                        <a:rPr lang="en-US" sz="2400" b="1" dirty="0" smtClean="0">
+                          <a:solidFill>
+                            <a:srgbClr val="666666"/>
+                          </a:solidFill>
+                          <a:latin typeface="Lovelo Black" pitchFamily="18"/>
+                          <a:ea typeface="Droid Sans Fallback" pitchFamily="2"/>
+                          <a:cs typeface="FreeSans" pitchFamily="2"/>
+                        </a:rPr>
+                        <a:t>:</a:t>
+                      </a:r>
+                      <a:r>
+                        <a:rPr lang="pl-PL" sz="2400" b="1" dirty="0" smtClean="0">
+                          <a:solidFill>
+                            <a:srgbClr val="666666"/>
+                          </a:solidFill>
+                          <a:latin typeface="Lovelo Black" pitchFamily="18"/>
+                          <a:ea typeface="Droid Sans Fallback" pitchFamily="2"/>
+                          <a:cs typeface="FreeSans" pitchFamily="2"/>
+                        </a:rPr>
+                        <a:t>	</a:t>
+                      </a:r>
+                      <a:endParaRPr lang="pl-PL" sz="2400" dirty="0"/>
+                    </a:p>
+                  </a:txBody>
+                  <a:tcPr>
+                    <a:lnL w="12700" cap="flat" cmpd="sng" algn="ctr">
+                      <a:noFill/>
+                      <a:prstDash val="solid"/>
+                      <a:round/>
+                      <a:headEnd type="none" w="med" len="med"/>
+                      <a:tailEnd type="none" w="med" len="med"/>
+                    </a:lnL>
+                    <a:lnR w="12700" cap="flat" cmpd="sng" algn="ctr">
+                      <a:noFill/>
+                      <a:prstDash val="solid"/>
+                      <a:round/>
+                      <a:headEnd type="none" w="med" len="med"/>
+                      <a:tailEnd type="none" w="med" len="med"/>
+                    </a:lnR>
+                    <a:lnT w="12700" cap="flat" cmpd="sng" algn="ctr">
+                      <a:noFill/>
+                      <a:prstDash val="solid"/>
+                      <a:round/>
+                      <a:headEnd type="none" w="med" len="med"/>
+                      <a:tailEnd type="none" w="med" len="med"/>
+                    </a:lnT>
+                    <a:lnB w="12700" cap="flat" cmpd="sng" algn="ctr">
+                      <a:noFill/>
+                      <a:prstDash val="solid"/>
+                      <a:round/>
+                      <a:headEnd type="none" w="med" len="med"/>
+                      <a:tailEnd type="none" w="med" len="med"/>
+                    </a:lnB>
+                    <a:lnTlToBr w="12700" cmpd="sng">
+                      <a:noFill/>
+                      <a:prstDash val="solid"/>
+                    </a:lnTlToBr>
+                    <a:lnBlToTr w="12700" cmpd="sng">
+                      <a:noFill/>
+                      <a:prstDash val="solid"/>
+                    </a:lnBlToTr>
+                    <a:noFill/>
+                  </a:tcPr>
+                </a:tc>
+                <a:tc>
+                  <a:txBody>
+                    <a:bodyPr/>
+                    <a:lstStyle/>
+                    <a:p>
+                      <a:pPr algn="l"/>
+                      <a:r>
+                        <a:rPr lang="pl-PL" sz="2400" dirty="0" smtClean="0">
+                          <a:solidFill>
+                            <a:srgbClr val="666666"/>
+                          </a:solidFill>
+                          <a:latin typeface="Bitter" panose="00000500000000000000" pitchFamily="50" charset="-18"/>
+                          <a:ea typeface="Droid Sans Fallback" pitchFamily="2"/>
+                          <a:cs typeface="FreeSans" pitchFamily="2"/>
+                        </a:rPr>
+                        <a:t>2012: v.0.0.0</a:t>
+                      </a:r>
+                    </a:p>
+                    <a:p>
+                      <a:pPr marL="0" marR="0" lvl="0" indent="0" algn="l" defTabSz="914400" rtl="0" eaLnBrk="1" fontAlgn="auto" latinLnBrk="0" hangingPunct="1">
+                        <a:lnSpc>
+                          <a:spcPct val="100000"/>
+                        </a:lnSpc>
+                        <a:spcBef>
+                          <a:spcPts val="0"/>
+                        </a:spcBef>
+                        <a:spcAft>
+                          <a:spcPts val="0"/>
+                        </a:spcAft>
+                        <a:buClrTx/>
+                        <a:buSzTx/>
+                        <a:buFontTx/>
+                        <a:buNone/>
+                        <a:tabLst/>
+                        <a:defRPr/>
+                      </a:pPr>
+                      <a:r>
+                        <a:rPr lang="pl-PL" sz="2400" dirty="0" smtClean="0">
+                          <a:solidFill>
+                            <a:srgbClr val="666666"/>
+                          </a:solidFill>
+                          <a:latin typeface="Bitter" panose="00000500000000000000" pitchFamily="50" charset="-18"/>
+                          <a:ea typeface="Droid Sans Fallback" pitchFamily="2"/>
+                          <a:cs typeface="FreeSans" pitchFamily="2"/>
+                        </a:rPr>
+                        <a:t>2014:</a:t>
+                      </a:r>
+                      <a:r>
+                        <a:rPr lang="pl-PL" sz="2400" b="1" dirty="0" smtClean="0">
+                          <a:solidFill>
+                            <a:srgbClr val="666666"/>
+                          </a:solidFill>
+                          <a:latin typeface="Lovelo Black" pitchFamily="18"/>
+                          <a:ea typeface="Droid Sans Fallback" pitchFamily="2"/>
+                          <a:cs typeface="FreeSans" pitchFamily="2"/>
+                        </a:rPr>
+                        <a:t> </a:t>
+                      </a:r>
+                      <a:r>
+                        <a:rPr lang="pl-PL" sz="2400" dirty="0" smtClean="0">
+                          <a:solidFill>
+                            <a:schemeClr val="bg2">
+                              <a:lumMod val="50000"/>
+                            </a:schemeClr>
+                          </a:solidFill>
+                          <a:latin typeface="Bitter" panose="00000500000000000000" pitchFamily="50" charset="-18"/>
+                          <a:ea typeface="Droid Sans Fallback" pitchFamily="2"/>
+                          <a:cs typeface="FreeSans" pitchFamily="2"/>
+                        </a:rPr>
+                        <a:t>v.1.0.0</a:t>
+                      </a:r>
+                      <a:endParaRPr lang="pl-PL" sz="2400" i="0" u="none" strike="noStrike" kern="1200" cap="none" dirty="0" smtClean="0">
+                        <a:ln>
+                          <a:noFill/>
+                        </a:ln>
+                        <a:solidFill>
+                          <a:schemeClr val="bg2">
+                            <a:lumMod val="50000"/>
+                          </a:schemeClr>
+                        </a:solidFill>
+                        <a:latin typeface="Bitter" panose="00000500000000000000" pitchFamily="50" charset="-18"/>
+                        <a:ea typeface="Droid Sans Fallback" pitchFamily="2"/>
+                        <a:cs typeface="FreeSans" pitchFamily="2"/>
+                      </a:endParaRPr>
+                    </a:p>
+                    <a:p>
+                      <a:pPr algn="l"/>
+                      <a:r>
+                        <a:rPr lang="pl-PL" sz="2400" b="1" dirty="0" smtClean="0">
+                          <a:solidFill>
+                            <a:srgbClr val="666666"/>
+                          </a:solidFill>
+                          <a:latin typeface="Lovelo Black" pitchFamily="18"/>
+                          <a:ea typeface="Droid Sans Fallback" pitchFamily="2"/>
+                          <a:cs typeface="FreeSans" pitchFamily="2"/>
+                        </a:rPr>
+                        <a:t> </a:t>
+                      </a:r>
+                      <a:endParaRPr lang="pl-PL" sz="2400" dirty="0"/>
+                    </a:p>
+                  </a:txBody>
+                  <a:tcPr>
+                    <a:lnL w="12700" cap="flat" cmpd="sng" algn="ctr">
+                      <a:noFill/>
+                      <a:prstDash val="solid"/>
+                      <a:round/>
+                      <a:headEnd type="none" w="med" len="med"/>
+                      <a:tailEnd type="none" w="med" len="med"/>
+                    </a:lnL>
+                    <a:lnR w="12700" cap="flat" cmpd="sng" algn="ctr">
+                      <a:noFill/>
+                      <a:prstDash val="solid"/>
+                      <a:round/>
+                      <a:headEnd type="none" w="med" len="med"/>
+                      <a:tailEnd type="none" w="med" len="med"/>
+                    </a:lnR>
+                    <a:lnT w="12700" cap="flat" cmpd="sng" algn="ctr">
+                      <a:noFill/>
+                      <a:prstDash val="solid"/>
+                      <a:round/>
+                      <a:headEnd type="none" w="med" len="med"/>
+                      <a:tailEnd type="none" w="med" len="med"/>
+                    </a:lnT>
+                    <a:lnB w="12700" cap="flat" cmpd="sng" algn="ctr">
+                      <a:noFill/>
+                      <a:prstDash val="solid"/>
+                      <a:round/>
+                      <a:headEnd type="none" w="med" len="med"/>
+                      <a:tailEnd type="none" w="med" len="med"/>
+                    </a:lnB>
+                    <a:lnTlToBr w="12700" cmpd="sng">
+                      <a:noFill/>
+                      <a:prstDash val="solid"/>
+                    </a:lnTlToBr>
+                    <a:lnBlToTr w="12700" cmpd="sng">
+                      <a:noFill/>
+                      <a:prstDash val="solid"/>
+                    </a:lnBlToTr>
+                    <a:noFill/>
+                  </a:tcPr>
+                </a:tc>
+              </a:tr>
+            </a:tbl>
+          </a:graphicData>
+        </a:graphic>
+      </p:graphicFrame>
     </p:spTree>
   </p:cSld>
   <p:clrMapOvr>

</xml_diff>

<commit_message>
Added example call to erlang to presentation
</commit_message>
<xml_diff>
--- a/elixir.pptx
+++ b/elixir.pptx
@@ -6089,7 +6089,7 @@
         </p:nvSpPr>
         <p:spPr>
           <a:xfrm>
-            <a:off x="652861" y="1525962"/>
+            <a:off x="627152" y="1444815"/>
             <a:ext cx="8595360" cy="608040"/>
           </a:xfrm>
         </p:spPr>
@@ -6154,8 +6154,8 @@
         </p:nvSpPr>
         <p:spPr>
           <a:xfrm>
-            <a:off x="1661651" y="2134002"/>
-            <a:ext cx="7841921" cy="1591193"/>
+            <a:off x="2204720" y="1961282"/>
+            <a:ext cx="7298852" cy="1591193"/>
           </a:xfrm>
           <a:prstGeom prst="rect">
             <a:avLst/>
@@ -6171,7 +6171,7 @@
           <a:p>
             <a:pPr lvl="0" algn="r" hangingPunct="0"/>
             <a:r>
-              <a:rPr lang="en-US" sz="2400" dirty="0">
+              <a:rPr lang="en-US" dirty="0">
                 <a:solidFill>
                   <a:schemeClr val="tx1">
                     <a:lumMod val="75000"/>
@@ -6183,7 +6183,7 @@
               <a:t>We frequently say that </a:t>
             </a:r>
             <a:r>
-              <a:rPr lang="en-US" sz="2400" b="1" dirty="0">
+              <a:rPr lang="en-US" b="1" dirty="0">
                 <a:solidFill>
                   <a:schemeClr val="tx1">
                     <a:lumMod val="75000"/>
@@ -6195,7 +6195,7 @@
               <a:t>the </a:t>
             </a:r>
             <a:r>
-              <a:rPr lang="en-US" sz="2400" b="1" dirty="0" err="1">
+              <a:rPr lang="en-US" b="1" dirty="0" err="1">
                 <a:solidFill>
                   <a:schemeClr val="tx1">
                     <a:lumMod val="75000"/>
@@ -6207,7 +6207,7 @@
               <a:t>Erlang</a:t>
             </a:r>
             <a:r>
-              <a:rPr lang="en-US" sz="2400" b="1" dirty="0">
+              <a:rPr lang="en-US" b="1" dirty="0">
                 <a:solidFill>
                   <a:schemeClr val="tx1">
                     <a:lumMod val="75000"/>
@@ -6219,7 +6219,7 @@
               <a:t> VM is Elixir's strongest asset</a:t>
             </a:r>
             <a:r>
-              <a:rPr lang="en-US" sz="2400" dirty="0" smtClean="0">
+              <a:rPr lang="en-US" dirty="0" smtClean="0">
                 <a:solidFill>
                   <a:schemeClr val="tx1">
                     <a:lumMod val="75000"/>
@@ -6230,7 +6230,7 @@
               </a:rPr>
               <a:t>.</a:t>
             </a:r>
-            <a:endParaRPr lang="pl-PL" sz="2400" dirty="0" smtClean="0">
+            <a:endParaRPr lang="pl-PL" dirty="0" smtClean="0">
               <a:solidFill>
                 <a:schemeClr val="tx1">
                   <a:lumMod val="75000"/>
@@ -6242,8 +6242,19 @@
           </a:p>
           <a:p>
             <a:pPr lvl="0" hangingPunct="0"/>
-            <a:r>
-              <a:rPr lang="en-US" sz="2400" dirty="0" smtClean="0">
+            <a:endParaRPr lang="pl-PL" dirty="0" smtClean="0">
+              <a:solidFill>
+                <a:schemeClr val="bg2">
+                  <a:lumMod val="50000"/>
+                </a:schemeClr>
+              </a:solidFill>
+              <a:latin typeface="Bitter" panose="00000500000000000000" pitchFamily="50" charset="-18"/>
+            </a:endParaRPr>
+          </a:p>
+          <a:p>
+            <a:pPr lvl="0" hangingPunct="0"/>
+            <a:r>
+              <a:rPr lang="en-US" dirty="0" smtClean="0">
                 <a:solidFill>
                   <a:schemeClr val="bg2">
                     <a:lumMod val="50000"/>
@@ -6254,7 +6265,7 @@
               <a:t>— </a:t>
             </a:r>
             <a:r>
-              <a:rPr lang="pl-PL" sz="2400" i="1" dirty="0" smtClean="0">
+              <a:rPr lang="pl-PL" i="1" dirty="0" smtClean="0">
                 <a:solidFill>
                   <a:schemeClr val="bg2">
                     <a:lumMod val="50000"/>
@@ -6265,7 +6276,7 @@
               <a:t>José </a:t>
             </a:r>
             <a:r>
-              <a:rPr lang="pl-PL" sz="2400" i="1" dirty="0">
+              <a:rPr lang="pl-PL" i="1" dirty="0">
                 <a:solidFill>
                   <a:schemeClr val="bg2">
                     <a:lumMod val="50000"/>
@@ -6275,7 +6286,7 @@
               </a:rPr>
               <a:t>Valim</a:t>
             </a:r>
-            <a:endParaRPr lang="en-US" sz="2400" b="0" i="0" u="none" strike="noStrike" kern="1200" cap="none" dirty="0">
+            <a:endParaRPr lang="en-US" b="0" i="0" u="none" strike="noStrike" kern="1200" cap="none" dirty="0">
               <a:ln>
                 <a:noFill/>
               </a:ln>
@@ -6333,6 +6344,1790 @@
           </a:ln>
         </p:spPr>
       </p:pic>
+      <p:sp>
+        <p:nvSpPr>
+          <p:cNvPr id="20" name="Rectangle 11"/>
+          <p:cNvSpPr>
+            <a:spLocks noChangeArrowheads="1"/>
+          </p:cNvSpPr>
+          <p:nvPr/>
+        </p:nvSpPr>
+        <p:spPr bwMode="auto">
+          <a:xfrm>
+            <a:off x="822960" y="4778663"/>
+            <a:ext cx="8399552" cy="1656000"/>
+          </a:xfrm>
+          <a:prstGeom prst="rect">
+            <a:avLst/>
+          </a:prstGeom>
+          <a:solidFill>
+            <a:schemeClr val="bg1">
+              <a:lumMod val="95000"/>
+            </a:schemeClr>
+          </a:solidFill>
+          <a:ln w="9525">
+            <a:solidFill>
+              <a:schemeClr val="bg2">
+                <a:lumMod val="90000"/>
+              </a:schemeClr>
+            </a:solidFill>
+            <a:miter lim="800000"/>
+            <a:headEnd/>
+            <a:tailEnd/>
+          </a:ln>
+          <a:effectLst/>
+        </p:spPr>
+        <p:txBody>
+          <a:bodyPr vert="horz" wrap="square" lIns="91440" tIns="45720" rIns="91440" bIns="45720" numCol="1" anchor="ctr" anchorCtr="0" compatLnSpc="1">
+            <a:prstTxWarp prst="textNoShape">
+              <a:avLst/>
+            </a:prstTxWarp>
+            <a:spAutoFit/>
+          </a:bodyPr>
+          <a:lstStyle/>
+          <a:p>
+            <a:pPr marL="0" marR="0" lvl="0" indent="0" algn="l" defTabSz="914400" rtl="0" eaLnBrk="0" fontAlgn="base" latinLnBrk="0" hangingPunct="0">
+              <a:lnSpc>
+                <a:spcPct val="100000"/>
+              </a:lnSpc>
+              <a:spcBef>
+                <a:spcPct val="0"/>
+              </a:spcBef>
+              <a:spcAft>
+                <a:spcPct val="0"/>
+              </a:spcAft>
+              <a:buClrTx/>
+              <a:buSzTx/>
+              <a:buFontTx/>
+              <a:buNone/>
+              <a:tabLst/>
+            </a:pPr>
+            <a:r>
+              <a:rPr kumimoji="0" lang="pl-PL" altLang="pl-PL" sz="1200" b="1" i="0" u="none" strike="noStrike" cap="none" normalizeH="0" baseline="0" dirty="0" smtClean="0">
+                <a:ln>
+                  <a:noFill/>
+                </a:ln>
+                <a:solidFill>
+                  <a:srgbClr val="555555"/>
+                </a:solidFill>
+                <a:effectLst/>
+                <a:latin typeface="Consolas" panose="020B0609020204030204" pitchFamily="49" charset="0"/>
+                <a:cs typeface="Consolas" panose="020B0609020204030204" pitchFamily="49" charset="0"/>
+              </a:rPr>
+              <a:t>iex(1)&gt; </a:t>
+            </a:r>
+            <a:r>
+              <a:rPr kumimoji="0" lang="pl-PL" altLang="pl-PL" sz="1200" b="0" i="0" u="none" strike="noStrike" cap="none" normalizeH="0" baseline="0" dirty="0" smtClean="0">
+                <a:ln>
+                  <a:noFill/>
+                </a:ln>
+                <a:solidFill>
+                  <a:srgbClr val="0000FF"/>
+                </a:solidFill>
+                <a:effectLst/>
+                <a:latin typeface="Consolas" panose="020B0609020204030204" pitchFamily="49" charset="0"/>
+                <a:cs typeface="Consolas" panose="020B0609020204030204" pitchFamily="49" charset="0"/>
+              </a:rPr>
+              <a:t>:timer</a:t>
+            </a:r>
+            <a:r>
+              <a:rPr kumimoji="0" lang="pl-PL" altLang="pl-PL" sz="1200" b="0" i="0" u="none" strike="noStrike" cap="none" normalizeH="0" baseline="0" dirty="0" smtClean="0">
+                <a:ln>
+                  <a:noFill/>
+                </a:ln>
+                <a:solidFill>
+                  <a:srgbClr val="666666"/>
+                </a:solidFill>
+                <a:effectLst/>
+                <a:latin typeface="Consolas" panose="020B0609020204030204" pitchFamily="49" charset="0"/>
+                <a:cs typeface="Consolas" panose="020B0609020204030204" pitchFamily="49" charset="0"/>
+              </a:rPr>
+              <a:t>.</a:t>
+            </a:r>
+            <a:r>
+              <a:rPr kumimoji="0" lang="pl-PL" altLang="pl-PL" sz="1200" b="0" i="0" u="none" strike="noStrike" cap="none" normalizeH="0" baseline="0" dirty="0" smtClean="0">
+                <a:ln>
+                  <a:noFill/>
+                </a:ln>
+                <a:solidFill>
+                  <a:schemeClr val="tx1"/>
+                </a:solidFill>
+                <a:effectLst/>
+                <a:latin typeface="Consolas" panose="020B0609020204030204" pitchFamily="49" charset="0"/>
+                <a:cs typeface="Consolas" panose="020B0609020204030204" pitchFamily="49" charset="0"/>
+              </a:rPr>
+              <a:t>tc</a:t>
+            </a:r>
+            <a:r>
+              <a:rPr kumimoji="0" lang="pl-PL" altLang="pl-PL" sz="1200" b="0" i="0" u="none" strike="noStrike" cap="none" normalizeH="0" baseline="0" dirty="0" smtClean="0">
+                <a:ln>
+                  <a:noFill/>
+                </a:ln>
+                <a:solidFill>
+                  <a:srgbClr val="000000"/>
+                </a:solidFill>
+                <a:effectLst/>
+                <a:latin typeface="Consolas" panose="020B0609020204030204" pitchFamily="49" charset="0"/>
+                <a:cs typeface="Consolas" panose="020B0609020204030204" pitchFamily="49" charset="0"/>
+              </a:rPr>
+              <a:t>(</a:t>
+            </a:r>
+            <a:r>
+              <a:rPr kumimoji="0" lang="pl-PL" altLang="pl-PL" sz="1200" b="0" i="0" u="none" strike="noStrike" cap="none" normalizeH="0" baseline="0" dirty="0" smtClean="0">
+                <a:ln>
+                  <a:noFill/>
+                </a:ln>
+                <a:solidFill>
+                  <a:srgbClr val="0000FF"/>
+                </a:solidFill>
+                <a:effectLst/>
+                <a:latin typeface="Consolas" panose="020B0609020204030204" pitchFamily="49" charset="0"/>
+                <a:cs typeface="Consolas" panose="020B0609020204030204" pitchFamily="49" charset="0"/>
+              </a:rPr>
+              <a:t>:lists</a:t>
+            </a:r>
+            <a:r>
+              <a:rPr kumimoji="0" lang="pl-PL" altLang="pl-PL" sz="1200" b="0" i="0" u="none" strike="noStrike" cap="none" normalizeH="0" baseline="0" dirty="0" smtClean="0">
+                <a:ln>
+                  <a:noFill/>
+                </a:ln>
+                <a:solidFill>
+                  <a:srgbClr val="000000"/>
+                </a:solidFill>
+                <a:effectLst/>
+                <a:latin typeface="Consolas" panose="020B0609020204030204" pitchFamily="49" charset="0"/>
+                <a:cs typeface="Consolas" panose="020B0609020204030204" pitchFamily="49" charset="0"/>
+              </a:rPr>
+              <a:t>, </a:t>
+            </a:r>
+            <a:r>
+              <a:rPr kumimoji="0" lang="pl-PL" altLang="pl-PL" sz="1200" b="0" i="0" u="none" strike="noStrike" cap="none" normalizeH="0" baseline="0" dirty="0" smtClean="0">
+                <a:ln>
+                  <a:noFill/>
+                </a:ln>
+                <a:solidFill>
+                  <a:srgbClr val="0000FF"/>
+                </a:solidFill>
+                <a:effectLst/>
+                <a:latin typeface="Consolas" panose="020B0609020204030204" pitchFamily="49" charset="0"/>
+                <a:cs typeface="Consolas" panose="020B0609020204030204" pitchFamily="49" charset="0"/>
+              </a:rPr>
+              <a:t>:filter</a:t>
+            </a:r>
+            <a:r>
+              <a:rPr kumimoji="0" lang="pl-PL" altLang="pl-PL" sz="1200" b="0" i="0" u="none" strike="noStrike" cap="none" normalizeH="0" baseline="0" dirty="0" smtClean="0">
+                <a:ln>
+                  <a:noFill/>
+                </a:ln>
+                <a:solidFill>
+                  <a:srgbClr val="000000"/>
+                </a:solidFill>
+                <a:effectLst/>
+                <a:latin typeface="Consolas" panose="020B0609020204030204" pitchFamily="49" charset="0"/>
+                <a:cs typeface="Consolas" panose="020B0609020204030204" pitchFamily="49" charset="0"/>
+              </a:rPr>
+              <a:t>, </a:t>
+            </a:r>
+            <a:endParaRPr lang="pl-PL" altLang="pl-PL" sz="1200" dirty="0">
+              <a:solidFill>
+                <a:srgbClr val="0000FF"/>
+              </a:solidFill>
+              <a:latin typeface="Consolas" panose="020B0609020204030204" pitchFamily="49" charset="0"/>
+              <a:cs typeface="Consolas" panose="020B0609020204030204" pitchFamily="49" charset="0"/>
+            </a:endParaRPr>
+          </a:p>
+          <a:p>
+            <a:pPr marL="0" marR="0" lvl="0" indent="0" algn="l" defTabSz="914400" rtl="0" eaLnBrk="0" fontAlgn="base" latinLnBrk="0" hangingPunct="0">
+              <a:lnSpc>
+                <a:spcPct val="100000"/>
+              </a:lnSpc>
+              <a:spcBef>
+                <a:spcPct val="0"/>
+              </a:spcBef>
+              <a:spcAft>
+                <a:spcPct val="0"/>
+              </a:spcAft>
+              <a:buClrTx/>
+              <a:buSzTx/>
+              <a:buFontTx/>
+              <a:buNone/>
+              <a:tabLst/>
+            </a:pPr>
+            <a:r>
+              <a:rPr kumimoji="0" lang="pl-PL" altLang="pl-PL" sz="1200" b="0" i="0" u="none" strike="noStrike" cap="none" normalizeH="0" baseline="0" dirty="0" smtClean="0">
+                <a:ln>
+                  <a:noFill/>
+                </a:ln>
+                <a:solidFill>
+                  <a:srgbClr val="888888"/>
+                </a:solidFill>
+                <a:effectLst/>
+                <a:latin typeface="Consolas" panose="020B0609020204030204" pitchFamily="49" charset="0"/>
+                <a:cs typeface="Consolas" panose="020B0609020204030204" pitchFamily="49" charset="0"/>
+              </a:rPr>
+              <a:t>	</a:t>
+            </a:r>
+            <a:r>
+              <a:rPr kumimoji="0" lang="pl-PL" altLang="pl-PL" sz="1200" b="0" i="0" u="none" strike="noStrike" cap="none" normalizeH="0" baseline="0" dirty="0" smtClean="0">
+                <a:ln>
+                  <a:noFill/>
+                </a:ln>
+                <a:effectLst/>
+                <a:latin typeface="Consolas" panose="020B0609020204030204" pitchFamily="49" charset="0"/>
+                <a:cs typeface="Consolas" panose="020B0609020204030204" pitchFamily="49" charset="0"/>
+              </a:rPr>
+              <a:t>[</a:t>
+            </a:r>
+            <a:r>
+              <a:rPr kumimoji="0" lang="pl-PL" altLang="pl-PL" sz="1200" b="0" i="0" u="none" strike="noStrike" cap="none" normalizeH="0" baseline="0" dirty="0" smtClean="0">
+                <a:ln>
+                  <a:noFill/>
+                </a:ln>
+                <a:solidFill>
+                  <a:srgbClr val="888888"/>
+                </a:solidFill>
+                <a:effectLst/>
+                <a:latin typeface="Consolas" panose="020B0609020204030204" pitchFamily="49" charset="0"/>
+                <a:cs typeface="Consolas" panose="020B0609020204030204" pitchFamily="49" charset="0"/>
+              </a:rPr>
+              <a:t> </a:t>
+            </a:r>
+            <a:r>
+              <a:rPr kumimoji="0" lang="pl-PL" altLang="pl-PL" sz="1200" b="1" i="0" u="none" strike="noStrike" cap="none" normalizeH="0" baseline="0" dirty="0" smtClean="0">
+                <a:ln>
+                  <a:noFill/>
+                </a:ln>
+                <a:solidFill>
+                  <a:srgbClr val="000080"/>
+                </a:solidFill>
+                <a:effectLst/>
+                <a:latin typeface="Consolas" panose="020B0609020204030204" pitchFamily="49" charset="0"/>
+                <a:cs typeface="Consolas" panose="020B0609020204030204" pitchFamily="49" charset="0"/>
+              </a:rPr>
+              <a:t>fn</a:t>
+            </a:r>
+            <a:r>
+              <a:rPr kumimoji="0" lang="pl-PL" altLang="pl-PL" sz="1200" b="0" i="0" u="none" strike="noStrike" cap="none" normalizeH="0" baseline="0" dirty="0" smtClean="0">
+                <a:ln>
+                  <a:noFill/>
+                </a:ln>
+                <a:solidFill>
+                  <a:srgbClr val="888888"/>
+                </a:solidFill>
+                <a:effectLst/>
+                <a:latin typeface="Consolas" panose="020B0609020204030204" pitchFamily="49" charset="0"/>
+                <a:cs typeface="Consolas" panose="020B0609020204030204" pitchFamily="49" charset="0"/>
+              </a:rPr>
+              <a:t> </a:t>
+            </a:r>
+            <a:r>
+              <a:rPr kumimoji="0" lang="pl-PL" altLang="pl-PL" sz="1200" b="0" i="0" u="none" strike="noStrike" cap="none" normalizeH="0" baseline="0" dirty="0" smtClean="0">
+                <a:ln>
+                  <a:noFill/>
+                </a:ln>
+                <a:effectLst/>
+                <a:latin typeface="Consolas" panose="020B0609020204030204" pitchFamily="49" charset="0"/>
+                <a:cs typeface="Consolas" panose="020B0609020204030204" pitchFamily="49" charset="0"/>
+              </a:rPr>
+              <a:t>x</a:t>
+            </a:r>
+            <a:r>
+              <a:rPr kumimoji="0" lang="pl-PL" altLang="pl-PL" sz="1200" b="0" i="0" u="none" strike="noStrike" cap="none" normalizeH="0" baseline="0" dirty="0" smtClean="0">
+                <a:ln>
+                  <a:noFill/>
+                </a:ln>
+                <a:solidFill>
+                  <a:schemeClr val="bg2">
+                    <a:lumMod val="50000"/>
+                  </a:schemeClr>
+                </a:solidFill>
+                <a:effectLst/>
+                <a:latin typeface="Consolas" panose="020B0609020204030204" pitchFamily="49" charset="0"/>
+                <a:cs typeface="Consolas" panose="020B0609020204030204" pitchFamily="49" charset="0"/>
+              </a:rPr>
+              <a:t> -&gt; </a:t>
+            </a:r>
+            <a:r>
+              <a:rPr kumimoji="0" lang="pl-PL" altLang="pl-PL" sz="1200" b="0" i="0" u="none" strike="noStrike" cap="none" normalizeH="0" baseline="0" dirty="0" smtClean="0">
+                <a:ln>
+                  <a:noFill/>
+                </a:ln>
+                <a:effectLst/>
+                <a:latin typeface="Consolas" panose="020B0609020204030204" pitchFamily="49" charset="0"/>
+                <a:cs typeface="Consolas" panose="020B0609020204030204" pitchFamily="49" charset="0"/>
+              </a:rPr>
+              <a:t>rem(x,</a:t>
+            </a:r>
+            <a:r>
+              <a:rPr kumimoji="0" lang="pl-PL" altLang="pl-PL" sz="1200" b="0" i="0" u="none" strike="noStrike" cap="none" normalizeH="0" baseline="0" dirty="0" smtClean="0">
+                <a:ln>
+                  <a:noFill/>
+                </a:ln>
+                <a:solidFill>
+                  <a:srgbClr val="000080"/>
+                </a:solidFill>
+                <a:effectLst/>
+                <a:latin typeface="Consolas" panose="020B0609020204030204" pitchFamily="49" charset="0"/>
+                <a:cs typeface="Consolas" panose="020B0609020204030204" pitchFamily="49" charset="0"/>
+              </a:rPr>
+              <a:t>3</a:t>
+            </a:r>
+            <a:r>
+              <a:rPr kumimoji="0" lang="pl-PL" altLang="pl-PL" sz="1200" b="0" i="0" u="none" strike="noStrike" cap="none" normalizeH="0" baseline="0" dirty="0" smtClean="0">
+                <a:ln>
+                  <a:noFill/>
+                </a:ln>
+                <a:effectLst/>
+                <a:latin typeface="Consolas" panose="020B0609020204030204" pitchFamily="49" charset="0"/>
+                <a:cs typeface="Consolas" panose="020B0609020204030204" pitchFamily="49" charset="0"/>
+              </a:rPr>
+              <a:t>) == </a:t>
+            </a:r>
+            <a:r>
+              <a:rPr kumimoji="0" lang="pl-PL" altLang="pl-PL" sz="1200" b="0" i="0" u="none" strike="noStrike" cap="none" normalizeH="0" baseline="0" dirty="0" smtClean="0">
+                <a:ln>
+                  <a:noFill/>
+                </a:ln>
+                <a:solidFill>
+                  <a:srgbClr val="000080"/>
+                </a:solidFill>
+                <a:effectLst/>
+                <a:latin typeface="Consolas" panose="020B0609020204030204" pitchFamily="49" charset="0"/>
+                <a:cs typeface="Consolas" panose="020B0609020204030204" pitchFamily="49" charset="0"/>
+              </a:rPr>
+              <a:t>0</a:t>
+            </a:r>
+            <a:r>
+              <a:rPr kumimoji="0" lang="pl-PL" altLang="pl-PL" sz="1200" b="0" i="0" u="none" strike="noStrike" cap="none" normalizeH="0" baseline="0" dirty="0" smtClean="0">
+                <a:ln>
+                  <a:noFill/>
+                </a:ln>
+                <a:solidFill>
+                  <a:srgbClr val="888888"/>
+                </a:solidFill>
+                <a:effectLst/>
+                <a:latin typeface="Consolas" panose="020B0609020204030204" pitchFamily="49" charset="0"/>
+                <a:cs typeface="Consolas" panose="020B0609020204030204" pitchFamily="49" charset="0"/>
+              </a:rPr>
+              <a:t> </a:t>
+            </a:r>
+            <a:r>
+              <a:rPr kumimoji="0" lang="pl-PL" altLang="pl-PL" sz="1200" b="0" i="0" u="none" strike="noStrike" cap="none" normalizeH="0" baseline="0" dirty="0" smtClean="0">
+                <a:ln>
+                  <a:noFill/>
+                </a:ln>
+                <a:solidFill>
+                  <a:srgbClr val="000080"/>
+                </a:solidFill>
+                <a:effectLst/>
+                <a:latin typeface="Consolas" panose="020B0609020204030204" pitchFamily="49" charset="0"/>
+                <a:cs typeface="Consolas" panose="020B0609020204030204" pitchFamily="49" charset="0"/>
+              </a:rPr>
+              <a:t>end</a:t>
+            </a:r>
+            <a:r>
+              <a:rPr kumimoji="0" lang="pl-PL" altLang="pl-PL" sz="1200" b="0" i="0" u="none" strike="noStrike" cap="none" normalizeH="0" baseline="0" dirty="0" smtClean="0">
+                <a:ln>
+                  <a:noFill/>
+                </a:ln>
+                <a:effectLst/>
+                <a:latin typeface="Consolas" panose="020B0609020204030204" pitchFamily="49" charset="0"/>
+                <a:cs typeface="Consolas" panose="020B0609020204030204" pitchFamily="49" charset="0"/>
+              </a:rPr>
+              <a:t>,</a:t>
+            </a:r>
+            <a:r>
+              <a:rPr kumimoji="0" lang="pl-PL" altLang="pl-PL" sz="1200" b="0" i="0" u="none" strike="noStrike" cap="none" normalizeH="0" baseline="0" dirty="0" smtClean="0">
+                <a:ln>
+                  <a:noFill/>
+                </a:ln>
+                <a:solidFill>
+                  <a:srgbClr val="888888"/>
+                </a:solidFill>
+                <a:effectLst/>
+                <a:latin typeface="Consolas" panose="020B0609020204030204" pitchFamily="49" charset="0"/>
+                <a:cs typeface="Consolas" panose="020B0609020204030204" pitchFamily="49" charset="0"/>
+              </a:rPr>
+              <a:t> </a:t>
+            </a:r>
+            <a:r>
+              <a:rPr kumimoji="0" lang="pl-PL" altLang="pl-PL" sz="1200" b="0" i="0" u="none" strike="noStrike" cap="none" normalizeH="0" baseline="0" dirty="0" smtClean="0">
+                <a:ln>
+                  <a:noFill/>
+                </a:ln>
+                <a:solidFill>
+                  <a:srgbClr val="000080"/>
+                </a:solidFill>
+                <a:effectLst/>
+                <a:latin typeface="Consolas" panose="020B0609020204030204" pitchFamily="49" charset="0"/>
+                <a:cs typeface="Consolas" panose="020B0609020204030204" pitchFamily="49" charset="0"/>
+              </a:rPr>
+              <a:t>:lists</a:t>
+            </a:r>
+            <a:r>
+              <a:rPr kumimoji="0" lang="pl-PL" altLang="pl-PL" sz="1200" b="0" i="0" u="none" strike="noStrike" cap="none" normalizeH="0" baseline="0" dirty="0" smtClean="0">
+                <a:ln>
+                  <a:noFill/>
+                </a:ln>
+                <a:solidFill>
+                  <a:srgbClr val="888888"/>
+                </a:solidFill>
+                <a:effectLst/>
+                <a:latin typeface="Consolas" panose="020B0609020204030204" pitchFamily="49" charset="0"/>
+                <a:cs typeface="Consolas" panose="020B0609020204030204" pitchFamily="49" charset="0"/>
+              </a:rPr>
+              <a:t>.</a:t>
+            </a:r>
+            <a:r>
+              <a:rPr kumimoji="0" lang="pl-PL" altLang="pl-PL" sz="1200" b="0" i="0" u="none" strike="noStrike" cap="none" normalizeH="0" baseline="0" dirty="0" smtClean="0">
+                <a:ln>
+                  <a:noFill/>
+                </a:ln>
+                <a:effectLst/>
+                <a:latin typeface="Consolas" panose="020B0609020204030204" pitchFamily="49" charset="0"/>
+                <a:cs typeface="Consolas" panose="020B0609020204030204" pitchFamily="49" charset="0"/>
+              </a:rPr>
+              <a:t>seq(</a:t>
+            </a:r>
+            <a:r>
+              <a:rPr kumimoji="0" lang="pl-PL" altLang="pl-PL" sz="1200" b="0" i="0" u="none" strike="noStrike" cap="none" normalizeH="0" baseline="0" dirty="0" smtClean="0">
+                <a:ln>
+                  <a:noFill/>
+                </a:ln>
+                <a:solidFill>
+                  <a:srgbClr val="000080"/>
+                </a:solidFill>
+                <a:effectLst/>
+                <a:latin typeface="Consolas" panose="020B0609020204030204" pitchFamily="49" charset="0"/>
+                <a:cs typeface="Consolas" panose="020B0609020204030204" pitchFamily="49" charset="0"/>
+              </a:rPr>
+              <a:t>1</a:t>
+            </a:r>
+            <a:r>
+              <a:rPr kumimoji="0" lang="pl-PL" altLang="pl-PL" sz="1200" b="0" i="0" u="none" strike="noStrike" cap="none" normalizeH="0" baseline="0" dirty="0" smtClean="0">
+                <a:ln>
+                  <a:noFill/>
+                </a:ln>
+                <a:solidFill>
+                  <a:srgbClr val="888888"/>
+                </a:solidFill>
+                <a:effectLst/>
+                <a:latin typeface="Consolas" panose="020B0609020204030204" pitchFamily="49" charset="0"/>
+                <a:cs typeface="Consolas" panose="020B0609020204030204" pitchFamily="49" charset="0"/>
+              </a:rPr>
+              <a:t>, </a:t>
+            </a:r>
+            <a:r>
+              <a:rPr kumimoji="0" lang="pl-PL" altLang="pl-PL" sz="1200" b="0" i="0" u="none" strike="noStrike" cap="none" normalizeH="0" baseline="0" dirty="0" smtClean="0">
+                <a:ln>
+                  <a:noFill/>
+                </a:ln>
+                <a:solidFill>
+                  <a:srgbClr val="000080"/>
+                </a:solidFill>
+                <a:effectLst/>
+                <a:latin typeface="Consolas" panose="020B0609020204030204" pitchFamily="49" charset="0"/>
+                <a:cs typeface="Consolas" panose="020B0609020204030204" pitchFamily="49" charset="0"/>
+              </a:rPr>
+              <a:t>1000000</a:t>
+            </a:r>
+            <a:r>
+              <a:rPr kumimoji="0" lang="pl-PL" altLang="pl-PL" sz="1200" b="0" i="0" u="none" strike="noStrike" cap="none" normalizeH="0" baseline="0" dirty="0" smtClean="0">
+                <a:ln>
+                  <a:noFill/>
+                </a:ln>
+                <a:effectLst/>
+                <a:latin typeface="Consolas" panose="020B0609020204030204" pitchFamily="49" charset="0"/>
+                <a:cs typeface="Consolas" panose="020B0609020204030204" pitchFamily="49" charset="0"/>
+              </a:rPr>
+              <a:t>) ]) </a:t>
+            </a:r>
+          </a:p>
+          <a:p>
+            <a:pPr marL="0" marR="0" lvl="0" indent="0" algn="l" defTabSz="914400" rtl="0" eaLnBrk="0" fontAlgn="base" latinLnBrk="0" hangingPunct="0">
+              <a:lnSpc>
+                <a:spcPct val="100000"/>
+              </a:lnSpc>
+              <a:spcBef>
+                <a:spcPct val="0"/>
+              </a:spcBef>
+              <a:spcAft>
+                <a:spcPct val="0"/>
+              </a:spcAft>
+              <a:buClrTx/>
+              <a:buSzTx/>
+              <a:buFontTx/>
+              <a:buNone/>
+              <a:tabLst/>
+            </a:pPr>
+            <a:r>
+              <a:rPr kumimoji="0" lang="pl-PL" altLang="pl-PL" sz="1200" b="0" i="0" u="none" strike="noStrike" cap="none" normalizeH="0" baseline="0" dirty="0" smtClean="0">
+                <a:ln>
+                  <a:noFill/>
+                </a:ln>
+                <a:solidFill>
+                  <a:srgbClr val="888888"/>
+                </a:solidFill>
+                <a:effectLst/>
+                <a:latin typeface="Consolas" panose="020B0609020204030204" pitchFamily="49" charset="0"/>
+                <a:cs typeface="Consolas" panose="020B0609020204030204" pitchFamily="49" charset="0"/>
+              </a:rPr>
+              <a:t>{2789563,[...]}</a:t>
+            </a:r>
+            <a:r>
+              <a:rPr kumimoji="0" lang="pl-PL" altLang="pl-PL" sz="1200" b="0" i="0" u="none" strike="noStrike" cap="none" normalizeH="0" baseline="0" dirty="0" smtClean="0">
+                <a:ln>
+                  <a:noFill/>
+                </a:ln>
+                <a:solidFill>
+                  <a:srgbClr val="000000"/>
+                </a:solidFill>
+                <a:effectLst/>
+                <a:latin typeface="Consolas" panose="020B0609020204030204" pitchFamily="49" charset="0"/>
+                <a:cs typeface="Consolas" panose="020B0609020204030204" pitchFamily="49" charset="0"/>
+              </a:rPr>
+              <a:t> </a:t>
+            </a:r>
+          </a:p>
+          <a:p>
+            <a:pPr marL="0" marR="0" lvl="0" indent="0" algn="l" defTabSz="914400" rtl="0" eaLnBrk="0" fontAlgn="base" latinLnBrk="0" hangingPunct="0">
+              <a:lnSpc>
+                <a:spcPct val="100000"/>
+              </a:lnSpc>
+              <a:spcBef>
+                <a:spcPct val="0"/>
+              </a:spcBef>
+              <a:spcAft>
+                <a:spcPct val="0"/>
+              </a:spcAft>
+              <a:buClrTx/>
+              <a:buSzTx/>
+              <a:buFontTx/>
+              <a:buNone/>
+              <a:tabLst/>
+            </a:pPr>
+            <a:endParaRPr kumimoji="0" lang="pl-PL" altLang="pl-PL" sz="1200" b="0" i="0" u="none" strike="noStrike" cap="none" normalizeH="0" baseline="0" dirty="0" smtClean="0">
+              <a:ln>
+                <a:noFill/>
+              </a:ln>
+              <a:solidFill>
+                <a:srgbClr val="000000"/>
+              </a:solidFill>
+              <a:effectLst/>
+              <a:latin typeface="Consolas" panose="020B0609020204030204" pitchFamily="49" charset="0"/>
+              <a:cs typeface="Consolas" panose="020B0609020204030204" pitchFamily="49" charset="0"/>
+            </a:endParaRPr>
+          </a:p>
+          <a:p>
+            <a:pPr marL="0" marR="0" lvl="0" indent="0" algn="l" defTabSz="914400" rtl="0" eaLnBrk="0" fontAlgn="base" latinLnBrk="0" hangingPunct="0">
+              <a:lnSpc>
+                <a:spcPct val="100000"/>
+              </a:lnSpc>
+              <a:spcBef>
+                <a:spcPct val="0"/>
+              </a:spcBef>
+              <a:spcAft>
+                <a:spcPct val="0"/>
+              </a:spcAft>
+              <a:buClrTx/>
+              <a:buSzTx/>
+              <a:buFontTx/>
+              <a:buNone/>
+              <a:tabLst/>
+            </a:pPr>
+            <a:r>
+              <a:rPr kumimoji="0" lang="pl-PL" altLang="pl-PL" sz="1200" b="1" i="0" u="none" strike="noStrike" cap="none" normalizeH="0" baseline="0" dirty="0" smtClean="0">
+                <a:ln>
+                  <a:noFill/>
+                </a:ln>
+                <a:solidFill>
+                  <a:srgbClr val="555555"/>
+                </a:solidFill>
+                <a:effectLst/>
+                <a:latin typeface="Consolas" panose="020B0609020204030204" pitchFamily="49" charset="0"/>
+                <a:cs typeface="Consolas" panose="020B0609020204030204" pitchFamily="49" charset="0"/>
+              </a:rPr>
+              <a:t>iex(2)&gt; </a:t>
+            </a:r>
+            <a:r>
+              <a:rPr kumimoji="0" lang="pl-PL" altLang="pl-PL" sz="1200" b="0" i="0" u="none" strike="noStrike" cap="none" normalizeH="0" baseline="0" dirty="0" smtClean="0">
+                <a:ln>
+                  <a:noFill/>
+                </a:ln>
+                <a:solidFill>
+                  <a:srgbClr val="0000FF"/>
+                </a:solidFill>
+                <a:effectLst/>
+                <a:latin typeface="Consolas" panose="020B0609020204030204" pitchFamily="49" charset="0"/>
+                <a:cs typeface="Consolas" panose="020B0609020204030204" pitchFamily="49" charset="0"/>
+              </a:rPr>
+              <a:t>:timer</a:t>
+            </a:r>
+            <a:r>
+              <a:rPr kumimoji="0" lang="pl-PL" altLang="pl-PL" sz="1200" b="0" i="0" u="none" strike="noStrike" cap="none" normalizeH="0" baseline="0" dirty="0" smtClean="0">
+                <a:ln>
+                  <a:noFill/>
+                </a:ln>
+                <a:solidFill>
+                  <a:srgbClr val="666666"/>
+                </a:solidFill>
+                <a:effectLst/>
+                <a:latin typeface="Consolas" panose="020B0609020204030204" pitchFamily="49" charset="0"/>
+                <a:cs typeface="Consolas" panose="020B0609020204030204" pitchFamily="49" charset="0"/>
+              </a:rPr>
+              <a:t>.</a:t>
+            </a:r>
+            <a:r>
+              <a:rPr kumimoji="0" lang="pl-PL" altLang="pl-PL" sz="1200" b="0" i="0" u="none" strike="noStrike" cap="none" normalizeH="0" baseline="0" dirty="0" smtClean="0">
+                <a:ln>
+                  <a:noFill/>
+                </a:ln>
+                <a:solidFill>
+                  <a:schemeClr val="tx1"/>
+                </a:solidFill>
+                <a:effectLst/>
+                <a:latin typeface="Consolas" panose="020B0609020204030204" pitchFamily="49" charset="0"/>
+                <a:cs typeface="Consolas" panose="020B0609020204030204" pitchFamily="49" charset="0"/>
+              </a:rPr>
+              <a:t>tc</a:t>
+            </a:r>
+            <a:r>
+              <a:rPr kumimoji="0" lang="pl-PL" altLang="pl-PL" sz="1200" b="0" i="0" u="none" strike="noStrike" cap="none" normalizeH="0" baseline="0" dirty="0" smtClean="0">
+                <a:ln>
+                  <a:noFill/>
+                </a:ln>
+                <a:solidFill>
+                  <a:srgbClr val="000000"/>
+                </a:solidFill>
+                <a:effectLst/>
+                <a:latin typeface="Consolas" panose="020B0609020204030204" pitchFamily="49" charset="0"/>
+                <a:cs typeface="Consolas" panose="020B0609020204030204" pitchFamily="49" charset="0"/>
+              </a:rPr>
+              <a:t>(</a:t>
+            </a:r>
+            <a:r>
+              <a:rPr kumimoji="0" lang="pl-PL" altLang="pl-PL" sz="1200" b="1" i="0" u="none" strike="noStrike" cap="none" normalizeH="0" baseline="0" dirty="0" smtClean="0">
+                <a:ln>
+                  <a:noFill/>
+                </a:ln>
+                <a:solidFill>
+                  <a:srgbClr val="0E84B5"/>
+                </a:solidFill>
+                <a:effectLst/>
+                <a:latin typeface="Consolas" panose="020B0609020204030204" pitchFamily="49" charset="0"/>
+                <a:cs typeface="Consolas" panose="020B0609020204030204" pitchFamily="49" charset="0"/>
+              </a:rPr>
+              <a:t>Enum</a:t>
+            </a:r>
+            <a:r>
+              <a:rPr kumimoji="0" lang="pl-PL" altLang="pl-PL" sz="1200" b="0" i="0" u="none" strike="noStrike" cap="none" normalizeH="0" baseline="0" dirty="0" smtClean="0">
+                <a:ln>
+                  <a:noFill/>
+                </a:ln>
+                <a:solidFill>
+                  <a:srgbClr val="000000"/>
+                </a:solidFill>
+                <a:effectLst/>
+                <a:latin typeface="Consolas" panose="020B0609020204030204" pitchFamily="49" charset="0"/>
+                <a:cs typeface="Consolas" panose="020B0609020204030204" pitchFamily="49" charset="0"/>
+              </a:rPr>
+              <a:t>, </a:t>
+            </a:r>
+            <a:r>
+              <a:rPr kumimoji="0" lang="pl-PL" altLang="pl-PL" sz="1200" b="0" i="0" u="none" strike="noStrike" cap="none" normalizeH="0" baseline="0" dirty="0" smtClean="0">
+                <a:ln>
+                  <a:noFill/>
+                </a:ln>
+                <a:solidFill>
+                  <a:srgbClr val="0000FF"/>
+                </a:solidFill>
+                <a:effectLst/>
+                <a:latin typeface="Consolas" panose="020B0609020204030204" pitchFamily="49" charset="0"/>
+                <a:cs typeface="Consolas" panose="020B0609020204030204" pitchFamily="49" charset="0"/>
+              </a:rPr>
+              <a:t>:filter</a:t>
+            </a:r>
+            <a:r>
+              <a:rPr kumimoji="0" lang="pl-PL" altLang="pl-PL" sz="1200" b="0" i="0" u="none" strike="noStrike" cap="none" normalizeH="0" baseline="0" dirty="0" smtClean="0">
+                <a:ln>
+                  <a:noFill/>
+                </a:ln>
+                <a:solidFill>
+                  <a:srgbClr val="000000"/>
+                </a:solidFill>
+                <a:effectLst/>
+                <a:latin typeface="Consolas" panose="020B0609020204030204" pitchFamily="49" charset="0"/>
+                <a:cs typeface="Consolas" panose="020B0609020204030204" pitchFamily="49" charset="0"/>
+              </a:rPr>
+              <a:t>, </a:t>
+            </a:r>
+          </a:p>
+          <a:p>
+            <a:pPr marL="0" marR="0" lvl="0" indent="0" algn="l" defTabSz="914400" rtl="0" eaLnBrk="0" fontAlgn="base" latinLnBrk="0" hangingPunct="0">
+              <a:lnSpc>
+                <a:spcPct val="100000"/>
+              </a:lnSpc>
+              <a:spcBef>
+                <a:spcPct val="0"/>
+              </a:spcBef>
+              <a:spcAft>
+                <a:spcPct val="0"/>
+              </a:spcAft>
+              <a:buClrTx/>
+              <a:buSzTx/>
+              <a:buFontTx/>
+              <a:buNone/>
+              <a:tabLst/>
+            </a:pPr>
+            <a:r>
+              <a:rPr kumimoji="0" lang="pl-PL" altLang="pl-PL" sz="1200" b="0" i="0" u="none" strike="noStrike" cap="none" normalizeH="0" baseline="0" dirty="0" smtClean="0">
+                <a:ln>
+                  <a:noFill/>
+                </a:ln>
+                <a:solidFill>
+                  <a:srgbClr val="000000"/>
+                </a:solidFill>
+                <a:effectLst/>
+                <a:latin typeface="Consolas" panose="020B0609020204030204" pitchFamily="49" charset="0"/>
+                <a:cs typeface="Consolas" panose="020B0609020204030204" pitchFamily="49" charset="0"/>
+              </a:rPr>
+              <a:t>	[ </a:t>
+            </a:r>
+            <a:r>
+              <a:rPr kumimoji="0" lang="pl-PL" altLang="pl-PL" sz="1200" b="0" i="0" u="none" strike="noStrike" cap="none" normalizeH="0" baseline="0" dirty="0" smtClean="0">
+                <a:ln>
+                  <a:noFill/>
+                </a:ln>
+                <a:solidFill>
+                  <a:srgbClr val="0000FF"/>
+                </a:solidFill>
+                <a:effectLst/>
+                <a:latin typeface="Consolas" panose="020B0609020204030204" pitchFamily="49" charset="0"/>
+                <a:cs typeface="Consolas" panose="020B0609020204030204" pitchFamily="49" charset="0"/>
+              </a:rPr>
+              <a:t>1</a:t>
+            </a:r>
+            <a:r>
+              <a:rPr kumimoji="0" lang="pl-PL" altLang="pl-PL" sz="1200" b="0" i="0" u="none" strike="noStrike" cap="none" normalizeH="0" baseline="0" dirty="0" smtClean="0">
+                <a:ln>
+                  <a:noFill/>
+                </a:ln>
+                <a:solidFill>
+                  <a:srgbClr val="666666"/>
+                </a:solidFill>
+                <a:effectLst/>
+                <a:latin typeface="Consolas" panose="020B0609020204030204" pitchFamily="49" charset="0"/>
+                <a:cs typeface="Consolas" panose="020B0609020204030204" pitchFamily="49" charset="0"/>
+              </a:rPr>
+              <a:t>..</a:t>
+            </a:r>
+            <a:r>
+              <a:rPr kumimoji="0" lang="pl-PL" altLang="pl-PL" sz="1200" b="0" i="0" u="none" strike="noStrike" cap="none" normalizeH="0" baseline="0" dirty="0" smtClean="0">
+                <a:ln>
+                  <a:noFill/>
+                </a:ln>
+                <a:solidFill>
+                  <a:srgbClr val="0000FF"/>
+                </a:solidFill>
+                <a:effectLst/>
+                <a:latin typeface="Consolas" panose="020B0609020204030204" pitchFamily="49" charset="0"/>
+                <a:cs typeface="Consolas" panose="020B0609020204030204" pitchFamily="49" charset="0"/>
+              </a:rPr>
+              <a:t>1000000</a:t>
+            </a:r>
+            <a:r>
+              <a:rPr kumimoji="0" lang="pl-PL" altLang="pl-PL" sz="1200" b="0" i="0" u="none" strike="noStrike" cap="none" normalizeH="0" baseline="0" dirty="0" smtClean="0">
+                <a:ln>
+                  <a:noFill/>
+                </a:ln>
+                <a:solidFill>
+                  <a:srgbClr val="000000"/>
+                </a:solidFill>
+                <a:effectLst/>
+                <a:latin typeface="Consolas" panose="020B0609020204030204" pitchFamily="49" charset="0"/>
+                <a:cs typeface="Consolas" panose="020B0609020204030204" pitchFamily="49" charset="0"/>
+              </a:rPr>
+              <a:t>, </a:t>
+            </a:r>
+            <a:r>
+              <a:rPr kumimoji="0" lang="pl-PL" altLang="pl-PL" sz="1200" b="1" i="0" u="none" strike="noStrike" cap="none" normalizeH="0" baseline="0" dirty="0" smtClean="0">
+                <a:ln>
+                  <a:noFill/>
+                </a:ln>
+                <a:solidFill>
+                  <a:srgbClr val="000080"/>
+                </a:solidFill>
+                <a:effectLst/>
+                <a:latin typeface="Consolas" panose="020B0609020204030204" pitchFamily="49" charset="0"/>
+                <a:cs typeface="Consolas" panose="020B0609020204030204" pitchFamily="49" charset="0"/>
+              </a:rPr>
+              <a:t>fn</a:t>
+            </a:r>
+            <a:r>
+              <a:rPr kumimoji="0" lang="pl-PL" altLang="pl-PL" sz="1200" b="0" i="0" u="none" strike="noStrike" cap="none" normalizeH="0" baseline="0" dirty="0" smtClean="0">
+                <a:ln>
+                  <a:noFill/>
+                </a:ln>
+                <a:solidFill>
+                  <a:srgbClr val="000000"/>
+                </a:solidFill>
+                <a:effectLst/>
+                <a:latin typeface="Consolas" panose="020B0609020204030204" pitchFamily="49" charset="0"/>
+                <a:cs typeface="Consolas" panose="020B0609020204030204" pitchFamily="49" charset="0"/>
+              </a:rPr>
+              <a:t> </a:t>
+            </a:r>
+            <a:r>
+              <a:rPr kumimoji="0" lang="pl-PL" altLang="pl-PL" sz="1200" b="0" i="0" u="none" strike="noStrike" cap="none" normalizeH="0" baseline="0" dirty="0" smtClean="0">
+                <a:ln>
+                  <a:noFill/>
+                </a:ln>
+                <a:solidFill>
+                  <a:schemeClr val="tx1"/>
+                </a:solidFill>
+                <a:effectLst/>
+                <a:latin typeface="Consolas" panose="020B0609020204030204" pitchFamily="49" charset="0"/>
+                <a:cs typeface="Consolas" panose="020B0609020204030204" pitchFamily="49" charset="0"/>
+              </a:rPr>
+              <a:t>x</a:t>
+            </a:r>
+            <a:r>
+              <a:rPr kumimoji="0" lang="pl-PL" altLang="pl-PL" sz="1200" b="0" i="0" u="none" strike="noStrike" cap="none" normalizeH="0" baseline="0" dirty="0" smtClean="0">
+                <a:ln>
+                  <a:noFill/>
+                </a:ln>
+                <a:solidFill>
+                  <a:srgbClr val="000000"/>
+                </a:solidFill>
+                <a:effectLst/>
+                <a:latin typeface="Consolas" panose="020B0609020204030204" pitchFamily="49" charset="0"/>
+                <a:cs typeface="Consolas" panose="020B0609020204030204" pitchFamily="49" charset="0"/>
+              </a:rPr>
+              <a:t> </a:t>
+            </a:r>
+            <a:r>
+              <a:rPr kumimoji="0" lang="pl-PL" altLang="pl-PL" sz="1200" b="0" i="0" u="none" strike="noStrike" cap="none" normalizeH="0" baseline="0" dirty="0" smtClean="0">
+                <a:ln>
+                  <a:noFill/>
+                </a:ln>
+                <a:solidFill>
+                  <a:srgbClr val="666666"/>
+                </a:solidFill>
+                <a:effectLst/>
+                <a:latin typeface="Consolas" panose="020B0609020204030204" pitchFamily="49" charset="0"/>
+                <a:cs typeface="Consolas" panose="020B0609020204030204" pitchFamily="49" charset="0"/>
+              </a:rPr>
+              <a:t>-&gt;</a:t>
+            </a:r>
+            <a:r>
+              <a:rPr kumimoji="0" lang="pl-PL" altLang="pl-PL" sz="1200" b="0" i="0" u="none" strike="noStrike" cap="none" normalizeH="0" baseline="0" dirty="0" smtClean="0">
+                <a:ln>
+                  <a:noFill/>
+                </a:ln>
+                <a:solidFill>
+                  <a:srgbClr val="000000"/>
+                </a:solidFill>
+                <a:effectLst/>
+                <a:latin typeface="Consolas" panose="020B0609020204030204" pitchFamily="49" charset="0"/>
+                <a:cs typeface="Consolas" panose="020B0609020204030204" pitchFamily="49" charset="0"/>
+              </a:rPr>
+              <a:t> </a:t>
+            </a:r>
+            <a:r>
+              <a:rPr kumimoji="0" lang="pl-PL" altLang="pl-PL" sz="1200" b="0" i="0" u="none" strike="noStrike" cap="none" normalizeH="0" baseline="0" dirty="0" smtClean="0">
+                <a:ln>
+                  <a:noFill/>
+                </a:ln>
+                <a:solidFill>
+                  <a:schemeClr val="tx1"/>
+                </a:solidFill>
+                <a:effectLst/>
+                <a:latin typeface="Consolas" panose="020B0609020204030204" pitchFamily="49" charset="0"/>
+                <a:cs typeface="Consolas" panose="020B0609020204030204" pitchFamily="49" charset="0"/>
+              </a:rPr>
+              <a:t>rem</a:t>
+            </a:r>
+            <a:r>
+              <a:rPr kumimoji="0" lang="pl-PL" altLang="pl-PL" sz="1200" b="0" i="0" u="none" strike="noStrike" cap="none" normalizeH="0" baseline="0" dirty="0" smtClean="0">
+                <a:ln>
+                  <a:noFill/>
+                </a:ln>
+                <a:solidFill>
+                  <a:srgbClr val="000000"/>
+                </a:solidFill>
+                <a:effectLst/>
+                <a:latin typeface="Consolas" panose="020B0609020204030204" pitchFamily="49" charset="0"/>
+                <a:cs typeface="Consolas" panose="020B0609020204030204" pitchFamily="49" charset="0"/>
+              </a:rPr>
+              <a:t>(</a:t>
+            </a:r>
+            <a:r>
+              <a:rPr kumimoji="0" lang="pl-PL" altLang="pl-PL" sz="1200" b="0" i="0" u="none" strike="noStrike" cap="none" normalizeH="0" baseline="0" dirty="0" smtClean="0">
+                <a:ln>
+                  <a:noFill/>
+                </a:ln>
+                <a:solidFill>
+                  <a:schemeClr val="tx1"/>
+                </a:solidFill>
+                <a:effectLst/>
+                <a:latin typeface="Consolas" panose="020B0609020204030204" pitchFamily="49" charset="0"/>
+                <a:cs typeface="Consolas" panose="020B0609020204030204" pitchFamily="49" charset="0"/>
+              </a:rPr>
+              <a:t>x</a:t>
+            </a:r>
+            <a:r>
+              <a:rPr kumimoji="0" lang="pl-PL" altLang="pl-PL" sz="1200" b="0" i="0" u="none" strike="noStrike" cap="none" normalizeH="0" baseline="0" dirty="0" smtClean="0">
+                <a:ln>
+                  <a:noFill/>
+                </a:ln>
+                <a:solidFill>
+                  <a:srgbClr val="000000"/>
+                </a:solidFill>
+                <a:effectLst/>
+                <a:latin typeface="Consolas" panose="020B0609020204030204" pitchFamily="49" charset="0"/>
+                <a:cs typeface="Consolas" panose="020B0609020204030204" pitchFamily="49" charset="0"/>
+              </a:rPr>
+              <a:t>,</a:t>
+            </a:r>
+            <a:r>
+              <a:rPr kumimoji="0" lang="pl-PL" altLang="pl-PL" sz="1200" b="0" i="0" u="none" strike="noStrike" cap="none" normalizeH="0" baseline="0" dirty="0" smtClean="0">
+                <a:ln>
+                  <a:noFill/>
+                </a:ln>
+                <a:solidFill>
+                  <a:srgbClr val="0000FF"/>
+                </a:solidFill>
+                <a:effectLst/>
+                <a:latin typeface="Consolas" panose="020B0609020204030204" pitchFamily="49" charset="0"/>
+                <a:cs typeface="Consolas" panose="020B0609020204030204" pitchFamily="49" charset="0"/>
+              </a:rPr>
+              <a:t>3</a:t>
+            </a:r>
+            <a:r>
+              <a:rPr kumimoji="0" lang="pl-PL" altLang="pl-PL" sz="1200" b="0" i="0" u="none" strike="noStrike" cap="none" normalizeH="0" baseline="0" dirty="0" smtClean="0">
+                <a:ln>
+                  <a:noFill/>
+                </a:ln>
+                <a:solidFill>
+                  <a:srgbClr val="000000"/>
+                </a:solidFill>
+                <a:effectLst/>
+                <a:latin typeface="Consolas" panose="020B0609020204030204" pitchFamily="49" charset="0"/>
+                <a:cs typeface="Consolas" panose="020B0609020204030204" pitchFamily="49" charset="0"/>
+              </a:rPr>
+              <a:t>) </a:t>
+            </a:r>
+            <a:r>
+              <a:rPr kumimoji="0" lang="pl-PL" altLang="pl-PL" sz="1200" b="0" i="0" u="none" strike="noStrike" cap="none" normalizeH="0" baseline="0" dirty="0" smtClean="0">
+                <a:ln>
+                  <a:noFill/>
+                </a:ln>
+                <a:solidFill>
+                  <a:srgbClr val="666666"/>
+                </a:solidFill>
+                <a:effectLst/>
+                <a:latin typeface="Consolas" panose="020B0609020204030204" pitchFamily="49" charset="0"/>
+                <a:cs typeface="Consolas" panose="020B0609020204030204" pitchFamily="49" charset="0"/>
+              </a:rPr>
+              <a:t>==</a:t>
+            </a:r>
+            <a:r>
+              <a:rPr kumimoji="0" lang="pl-PL" altLang="pl-PL" sz="1200" b="0" i="0" u="none" strike="noStrike" cap="none" normalizeH="0" baseline="0" dirty="0" smtClean="0">
+                <a:ln>
+                  <a:noFill/>
+                </a:ln>
+                <a:solidFill>
+                  <a:srgbClr val="000000"/>
+                </a:solidFill>
+                <a:effectLst/>
+                <a:latin typeface="Consolas" panose="020B0609020204030204" pitchFamily="49" charset="0"/>
+                <a:cs typeface="Consolas" panose="020B0609020204030204" pitchFamily="49" charset="0"/>
+              </a:rPr>
+              <a:t> </a:t>
+            </a:r>
+            <a:r>
+              <a:rPr kumimoji="0" lang="pl-PL" altLang="pl-PL" sz="1200" b="0" i="0" u="none" strike="noStrike" cap="none" normalizeH="0" baseline="0" dirty="0" smtClean="0">
+                <a:ln>
+                  <a:noFill/>
+                </a:ln>
+                <a:solidFill>
+                  <a:srgbClr val="0000FF"/>
+                </a:solidFill>
+                <a:effectLst/>
+                <a:latin typeface="Consolas" panose="020B0609020204030204" pitchFamily="49" charset="0"/>
+                <a:cs typeface="Consolas" panose="020B0609020204030204" pitchFamily="49" charset="0"/>
+              </a:rPr>
+              <a:t>0</a:t>
+            </a:r>
+            <a:r>
+              <a:rPr kumimoji="0" lang="pl-PL" altLang="pl-PL" sz="1200" b="0" i="0" u="none" strike="noStrike" cap="none" normalizeH="0" baseline="0" dirty="0" smtClean="0">
+                <a:ln>
+                  <a:noFill/>
+                </a:ln>
+                <a:solidFill>
+                  <a:srgbClr val="000000"/>
+                </a:solidFill>
+                <a:effectLst/>
+                <a:latin typeface="Consolas" panose="020B0609020204030204" pitchFamily="49" charset="0"/>
+                <a:cs typeface="Consolas" panose="020B0609020204030204" pitchFamily="49" charset="0"/>
+              </a:rPr>
+              <a:t> </a:t>
+            </a:r>
+            <a:r>
+              <a:rPr kumimoji="0" lang="pl-PL" altLang="pl-PL" sz="1200" b="1" i="0" u="none" strike="noStrike" cap="none" normalizeH="0" baseline="0" dirty="0" smtClean="0">
+                <a:ln>
+                  <a:noFill/>
+                </a:ln>
+                <a:solidFill>
+                  <a:srgbClr val="000080"/>
+                </a:solidFill>
+                <a:effectLst/>
+                <a:latin typeface="Consolas" panose="020B0609020204030204" pitchFamily="49" charset="0"/>
+                <a:cs typeface="Consolas" panose="020B0609020204030204" pitchFamily="49" charset="0"/>
+              </a:rPr>
+              <a:t>end</a:t>
+            </a:r>
+            <a:r>
+              <a:rPr kumimoji="0" lang="pl-PL" altLang="pl-PL" sz="1200" b="0" i="0" u="none" strike="noStrike" cap="none" normalizeH="0" baseline="0" dirty="0" smtClean="0">
+                <a:ln>
+                  <a:noFill/>
+                </a:ln>
+                <a:solidFill>
+                  <a:srgbClr val="000000"/>
+                </a:solidFill>
+                <a:effectLst/>
+                <a:latin typeface="Consolas" panose="020B0609020204030204" pitchFamily="49" charset="0"/>
+                <a:cs typeface="Consolas" panose="020B0609020204030204" pitchFamily="49" charset="0"/>
+              </a:rPr>
+              <a:t> ]) </a:t>
+            </a:r>
+          </a:p>
+          <a:p>
+            <a:pPr marL="0" marR="0" lvl="0" indent="0" algn="l" defTabSz="914400" rtl="0" eaLnBrk="0" fontAlgn="base" latinLnBrk="0" hangingPunct="0">
+              <a:lnSpc>
+                <a:spcPct val="100000"/>
+              </a:lnSpc>
+              <a:spcBef>
+                <a:spcPct val="0"/>
+              </a:spcBef>
+              <a:spcAft>
+                <a:spcPct val="0"/>
+              </a:spcAft>
+              <a:buClrTx/>
+              <a:buSzTx/>
+              <a:buFontTx/>
+              <a:buNone/>
+              <a:tabLst/>
+            </a:pPr>
+            <a:r>
+              <a:rPr kumimoji="0" lang="pl-PL" altLang="pl-PL" sz="1200" b="0" i="0" u="none" strike="noStrike" cap="none" normalizeH="0" baseline="0" dirty="0" smtClean="0">
+                <a:ln>
+                  <a:noFill/>
+                </a:ln>
+                <a:solidFill>
+                  <a:srgbClr val="888888"/>
+                </a:solidFill>
+                <a:effectLst/>
+                <a:latin typeface="Consolas" panose="020B0609020204030204" pitchFamily="49" charset="0"/>
+                <a:cs typeface="Consolas" panose="020B0609020204030204" pitchFamily="49" charset="0"/>
+              </a:rPr>
+              <a:t>{2277837,[...]}</a:t>
+            </a:r>
+            <a:r>
+              <a:rPr kumimoji="0" lang="pl-PL" altLang="pl-PL" sz="1200" b="0" i="0" u="none" strike="noStrike" cap="none" normalizeH="0" baseline="0" dirty="0" smtClean="0">
+                <a:ln>
+                  <a:noFill/>
+                </a:ln>
+                <a:solidFill>
+                  <a:schemeClr val="tx1"/>
+                </a:solidFill>
+                <a:effectLst/>
+                <a:latin typeface="Consolas" panose="020B0609020204030204" pitchFamily="49" charset="0"/>
+                <a:cs typeface="Consolas" panose="020B0609020204030204" pitchFamily="49" charset="0"/>
+              </a:rPr>
+              <a:t> </a:t>
+            </a:r>
+          </a:p>
+        </p:txBody>
+      </p:sp>
+      <p:sp>
+        <p:nvSpPr>
+          <p:cNvPr id="21" name="Rectangle 12"/>
+          <p:cNvSpPr>
+            <a:spLocks noChangeArrowheads="1"/>
+          </p:cNvSpPr>
+          <p:nvPr/>
+        </p:nvSpPr>
+        <p:spPr bwMode="auto">
+          <a:xfrm>
+            <a:off x="822960" y="3631281"/>
+            <a:ext cx="8388000" cy="900000"/>
+          </a:xfrm>
+          <a:prstGeom prst="rect">
+            <a:avLst/>
+          </a:prstGeom>
+          <a:solidFill>
+            <a:schemeClr val="bg1">
+              <a:lumMod val="95000"/>
+            </a:schemeClr>
+          </a:solidFill>
+          <a:ln w="9525">
+            <a:solidFill>
+              <a:schemeClr val="bg2">
+                <a:lumMod val="90000"/>
+              </a:schemeClr>
+            </a:solidFill>
+            <a:miter lim="800000"/>
+            <a:headEnd/>
+            <a:tailEnd/>
+          </a:ln>
+          <a:effectLst/>
+        </p:spPr>
+        <p:txBody>
+          <a:bodyPr vert="horz" wrap="square" lIns="91440" tIns="45720" rIns="91440" bIns="45720" numCol="1" anchor="ctr" anchorCtr="0" compatLnSpc="1">
+            <a:prstTxWarp prst="textNoShape">
+              <a:avLst/>
+            </a:prstTxWarp>
+            <a:spAutoFit/>
+          </a:bodyPr>
+          <a:lstStyle/>
+          <a:p>
+            <a:pPr marL="0" marR="0" lvl="0" indent="0" algn="l" defTabSz="914400" rtl="0" eaLnBrk="0" fontAlgn="base" latinLnBrk="0" hangingPunct="0">
+              <a:lnSpc>
+                <a:spcPct val="100000"/>
+              </a:lnSpc>
+              <a:spcBef>
+                <a:spcPct val="0"/>
+              </a:spcBef>
+              <a:spcAft>
+                <a:spcPct val="0"/>
+              </a:spcAft>
+              <a:buClrTx/>
+              <a:buSzTx/>
+              <a:buFontTx/>
+              <a:buNone/>
+              <a:tabLst/>
+            </a:pPr>
+            <a:r>
+              <a:rPr kumimoji="0" lang="pl-PL" altLang="pl-PL" sz="1200" b="0" i="0" u="none" strike="noStrike" cap="none" normalizeH="0" baseline="0" dirty="0" smtClean="0">
+                <a:ln>
+                  <a:noFill/>
+                </a:ln>
+                <a:solidFill>
+                  <a:srgbClr val="888888"/>
+                </a:solidFill>
+                <a:effectLst/>
+                <a:latin typeface="Consolas" panose="020B0609020204030204" pitchFamily="49" charset="0"/>
+                <a:cs typeface="Consolas" panose="020B0609020204030204" pitchFamily="49" charset="0"/>
+              </a:rPr>
+              <a:t>Eshell</a:t>
+            </a:r>
+            <a:r>
+              <a:rPr kumimoji="0" lang="pl-PL" altLang="pl-PL" sz="1200" b="0" i="0" u="none" strike="noStrike" cap="none" normalizeH="0" baseline="0" dirty="0" smtClean="0">
+                <a:ln>
+                  <a:noFill/>
+                </a:ln>
+                <a:solidFill>
+                  <a:srgbClr val="000000"/>
+                </a:solidFill>
+                <a:effectLst/>
+                <a:latin typeface="Consolas" panose="020B0609020204030204" pitchFamily="49" charset="0"/>
+                <a:cs typeface="Consolas" panose="020B0609020204030204" pitchFamily="49" charset="0"/>
+              </a:rPr>
+              <a:t> </a:t>
+            </a:r>
+            <a:r>
+              <a:rPr kumimoji="0" lang="pl-PL" altLang="pl-PL" sz="1200" b="1" i="0" u="none" strike="noStrike" cap="none" normalizeH="0" baseline="0" dirty="0" smtClean="0">
+                <a:ln>
+                  <a:noFill/>
+                </a:ln>
+                <a:solidFill>
+                  <a:srgbClr val="555555"/>
+                </a:solidFill>
+                <a:effectLst/>
+                <a:latin typeface="Consolas" panose="020B0609020204030204" pitchFamily="49" charset="0"/>
+                <a:cs typeface="Consolas" panose="020B0609020204030204" pitchFamily="49" charset="0"/>
+              </a:rPr>
+              <a:t>1&gt;</a:t>
+            </a:r>
+            <a:r>
+              <a:rPr kumimoji="0" lang="pl-PL" altLang="pl-PL" sz="1200" b="0" i="0" u="none" strike="noStrike" cap="none" normalizeH="0" baseline="0" dirty="0" smtClean="0">
+                <a:ln>
+                  <a:noFill/>
+                </a:ln>
+                <a:solidFill>
+                  <a:srgbClr val="000000"/>
+                </a:solidFill>
+                <a:effectLst/>
+                <a:latin typeface="Consolas" panose="020B0609020204030204" pitchFamily="49" charset="0"/>
+                <a:cs typeface="Consolas" panose="020B0609020204030204" pitchFamily="49" charset="0"/>
+              </a:rPr>
+              <a:t> </a:t>
+            </a:r>
+            <a:r>
+              <a:rPr kumimoji="0" lang="pl-PL" altLang="pl-PL" sz="1200" b="1" i="0" u="none" strike="noStrike" cap="none" normalizeH="0" baseline="0" dirty="0" smtClean="0">
+                <a:ln>
+                  <a:noFill/>
+                </a:ln>
+                <a:solidFill>
+                  <a:srgbClr val="0E84B5"/>
+                </a:solidFill>
+                <a:effectLst/>
+                <a:latin typeface="Consolas" panose="020B0609020204030204" pitchFamily="49" charset="0"/>
+                <a:cs typeface="Consolas" panose="020B0609020204030204" pitchFamily="49" charset="0"/>
+              </a:rPr>
+              <a:t>timer</a:t>
+            </a:r>
+            <a:r>
+              <a:rPr kumimoji="0" lang="pl-PL" altLang="pl-PL" sz="1200" b="0" i="0" u="none" strike="noStrike" cap="none" normalizeH="0" baseline="0" dirty="0" smtClean="0">
+                <a:ln>
+                  <a:noFill/>
+                </a:ln>
+                <a:solidFill>
+                  <a:srgbClr val="000000"/>
+                </a:solidFill>
+                <a:effectLst/>
+                <a:latin typeface="Consolas" panose="020B0609020204030204" pitchFamily="49" charset="0"/>
+                <a:cs typeface="Consolas" panose="020B0609020204030204" pitchFamily="49" charset="0"/>
+              </a:rPr>
+              <a:t>:</a:t>
+            </a:r>
+            <a:r>
+              <a:rPr kumimoji="0" lang="pl-PL" altLang="pl-PL" sz="1200" b="0" i="0" u="none" strike="noStrike" cap="none" normalizeH="0" baseline="0" dirty="0" smtClean="0">
+                <a:ln>
+                  <a:noFill/>
+                </a:ln>
+                <a:solidFill>
+                  <a:srgbClr val="06287E"/>
+                </a:solidFill>
+                <a:effectLst/>
+                <a:latin typeface="Consolas" panose="020B0609020204030204" pitchFamily="49" charset="0"/>
+                <a:cs typeface="Consolas" panose="020B0609020204030204" pitchFamily="49" charset="0"/>
+              </a:rPr>
+              <a:t>tc</a:t>
+            </a:r>
+            <a:r>
+              <a:rPr kumimoji="0" lang="pl-PL" altLang="pl-PL" sz="1200" b="0" i="0" u="none" strike="noStrike" cap="none" normalizeH="0" baseline="0" dirty="0" smtClean="0">
+                <a:ln>
+                  <a:noFill/>
+                </a:ln>
+                <a:solidFill>
+                  <a:srgbClr val="000000"/>
+                </a:solidFill>
+                <a:effectLst/>
+                <a:latin typeface="Consolas" panose="020B0609020204030204" pitchFamily="49" charset="0"/>
+                <a:cs typeface="Consolas" panose="020B0609020204030204" pitchFamily="49" charset="0"/>
+              </a:rPr>
+              <a:t>(</a:t>
+            </a:r>
+            <a:r>
+              <a:rPr kumimoji="0" lang="pl-PL" altLang="pl-PL" sz="1200" b="0" i="0" u="none" strike="noStrike" cap="none" normalizeH="0" baseline="0" dirty="0" smtClean="0">
+                <a:ln>
+                  <a:noFill/>
+                </a:ln>
+                <a:solidFill>
+                  <a:schemeClr val="tx1"/>
+                </a:solidFill>
+                <a:effectLst/>
+                <a:latin typeface="Consolas" panose="020B0609020204030204" pitchFamily="49" charset="0"/>
+                <a:cs typeface="Consolas" panose="020B0609020204030204" pitchFamily="49" charset="0"/>
+              </a:rPr>
+              <a:t>lists</a:t>
+            </a:r>
+            <a:r>
+              <a:rPr kumimoji="0" lang="pl-PL" altLang="pl-PL" sz="1200" b="0" i="0" u="none" strike="noStrike" cap="none" normalizeH="0" baseline="0" dirty="0" smtClean="0">
+                <a:ln>
+                  <a:noFill/>
+                </a:ln>
+                <a:solidFill>
+                  <a:srgbClr val="000000"/>
+                </a:solidFill>
+                <a:effectLst/>
+                <a:latin typeface="Consolas" panose="020B0609020204030204" pitchFamily="49" charset="0"/>
+                <a:cs typeface="Consolas" panose="020B0609020204030204" pitchFamily="49" charset="0"/>
+              </a:rPr>
+              <a:t>, </a:t>
+            </a:r>
+            <a:r>
+              <a:rPr kumimoji="0" lang="pl-PL" altLang="pl-PL" sz="1200" b="0" i="0" u="none" strike="noStrike" cap="none" normalizeH="0" baseline="0" dirty="0" smtClean="0">
+                <a:ln>
+                  <a:noFill/>
+                </a:ln>
+                <a:solidFill>
+                  <a:schemeClr val="tx1"/>
+                </a:solidFill>
+                <a:effectLst/>
+                <a:latin typeface="Consolas" panose="020B0609020204030204" pitchFamily="49" charset="0"/>
+                <a:cs typeface="Consolas" panose="020B0609020204030204" pitchFamily="49" charset="0"/>
+              </a:rPr>
+              <a:t>filter</a:t>
+            </a:r>
+            <a:r>
+              <a:rPr kumimoji="0" lang="pl-PL" altLang="pl-PL" sz="1200" b="0" i="0" u="none" strike="noStrike" cap="none" normalizeH="0" baseline="0" dirty="0" smtClean="0">
+                <a:ln>
+                  <a:noFill/>
+                </a:ln>
+                <a:solidFill>
+                  <a:srgbClr val="000000"/>
+                </a:solidFill>
+                <a:effectLst/>
+                <a:latin typeface="Consolas" panose="020B0609020204030204" pitchFamily="49" charset="0"/>
+                <a:cs typeface="Consolas" panose="020B0609020204030204" pitchFamily="49" charset="0"/>
+              </a:rPr>
+              <a:t>, </a:t>
+            </a:r>
+          </a:p>
+          <a:p>
+            <a:pPr marL="0" marR="0" lvl="0" indent="0" algn="l" defTabSz="914400" rtl="0" eaLnBrk="0" fontAlgn="base" latinLnBrk="0" hangingPunct="0">
+              <a:lnSpc>
+                <a:spcPct val="100000"/>
+              </a:lnSpc>
+              <a:spcBef>
+                <a:spcPct val="0"/>
+              </a:spcBef>
+              <a:spcAft>
+                <a:spcPct val="0"/>
+              </a:spcAft>
+              <a:buClrTx/>
+              <a:buSzTx/>
+              <a:buFontTx/>
+              <a:buNone/>
+              <a:tabLst/>
+            </a:pPr>
+            <a:r>
+              <a:rPr lang="pl-PL" altLang="pl-PL" sz="1200" dirty="0">
+                <a:solidFill>
+                  <a:srgbClr val="000000"/>
+                </a:solidFill>
+                <a:latin typeface="Consolas" panose="020B0609020204030204" pitchFamily="49" charset="0"/>
+                <a:cs typeface="Consolas" panose="020B0609020204030204" pitchFamily="49" charset="0"/>
+              </a:rPr>
+              <a:t>	</a:t>
+            </a:r>
+            <a:r>
+              <a:rPr kumimoji="0" lang="pl-PL" altLang="pl-PL" sz="1200" b="0" i="0" u="none" strike="noStrike" cap="none" normalizeH="0" baseline="0" dirty="0" smtClean="0">
+                <a:ln>
+                  <a:noFill/>
+                </a:ln>
+                <a:solidFill>
+                  <a:srgbClr val="000000"/>
+                </a:solidFill>
+                <a:effectLst/>
+                <a:latin typeface="Consolas" panose="020B0609020204030204" pitchFamily="49" charset="0"/>
+                <a:cs typeface="Consolas" panose="020B0609020204030204" pitchFamily="49" charset="0"/>
+              </a:rPr>
+              <a:t>[ </a:t>
+            </a:r>
+            <a:r>
+              <a:rPr kumimoji="0" lang="pl-PL" altLang="pl-PL" sz="1200" b="1" i="0" u="none" strike="noStrike" cap="none" normalizeH="0" baseline="0" dirty="0" smtClean="0">
+                <a:ln>
+                  <a:noFill/>
+                </a:ln>
+                <a:solidFill>
+                  <a:srgbClr val="000080"/>
+                </a:solidFill>
+                <a:effectLst/>
+                <a:latin typeface="Consolas" panose="020B0609020204030204" pitchFamily="49" charset="0"/>
+                <a:cs typeface="Consolas" panose="020B0609020204030204" pitchFamily="49" charset="0"/>
+              </a:rPr>
+              <a:t>fun</a:t>
+            </a:r>
+            <a:r>
+              <a:rPr kumimoji="0" lang="pl-PL" altLang="pl-PL" sz="1200" b="0" i="0" u="none" strike="noStrike" cap="none" normalizeH="0" baseline="0" dirty="0" smtClean="0">
+                <a:ln>
+                  <a:noFill/>
+                </a:ln>
+                <a:solidFill>
+                  <a:srgbClr val="000000"/>
+                </a:solidFill>
+                <a:effectLst/>
+                <a:latin typeface="Consolas" panose="020B0609020204030204" pitchFamily="49" charset="0"/>
+                <a:cs typeface="Consolas" panose="020B0609020204030204" pitchFamily="49" charset="0"/>
+              </a:rPr>
+              <a:t> (</a:t>
+            </a:r>
+            <a:r>
+              <a:rPr kumimoji="0" lang="pl-PL" altLang="pl-PL" sz="1200" b="0" i="0" u="none" strike="noStrike" cap="none" normalizeH="0" baseline="0" dirty="0" smtClean="0">
+                <a:ln>
+                  <a:noFill/>
+                </a:ln>
+                <a:solidFill>
+                  <a:srgbClr val="BB60D5"/>
+                </a:solidFill>
+                <a:effectLst/>
+                <a:latin typeface="Consolas" panose="020B0609020204030204" pitchFamily="49" charset="0"/>
+                <a:cs typeface="Consolas" panose="020B0609020204030204" pitchFamily="49" charset="0"/>
+              </a:rPr>
+              <a:t>X</a:t>
+            </a:r>
+            <a:r>
+              <a:rPr kumimoji="0" lang="pl-PL" altLang="pl-PL" sz="1200" b="0" i="0" u="none" strike="noStrike" cap="none" normalizeH="0" baseline="0" dirty="0" smtClean="0">
+                <a:ln>
+                  <a:noFill/>
+                </a:ln>
+                <a:solidFill>
+                  <a:srgbClr val="000000"/>
+                </a:solidFill>
+                <a:effectLst/>
+                <a:latin typeface="Consolas" panose="020B0609020204030204" pitchFamily="49" charset="0"/>
+                <a:cs typeface="Consolas" panose="020B0609020204030204" pitchFamily="49" charset="0"/>
+              </a:rPr>
+              <a:t>) </a:t>
+            </a:r>
+            <a:r>
+              <a:rPr kumimoji="0" lang="pl-PL" altLang="pl-PL" sz="1200" b="0" i="0" u="none" strike="noStrike" cap="none" normalizeH="0" baseline="0" dirty="0" smtClean="0">
+                <a:ln>
+                  <a:noFill/>
+                </a:ln>
+                <a:solidFill>
+                  <a:srgbClr val="666666"/>
+                </a:solidFill>
+                <a:effectLst/>
+                <a:latin typeface="Consolas" panose="020B0609020204030204" pitchFamily="49" charset="0"/>
+                <a:cs typeface="Consolas" panose="020B0609020204030204" pitchFamily="49" charset="0"/>
+              </a:rPr>
+              <a:t>-&gt;</a:t>
+            </a:r>
+            <a:r>
+              <a:rPr kumimoji="0" lang="pl-PL" altLang="pl-PL" sz="1200" b="0" i="0" u="none" strike="noStrike" cap="none" normalizeH="0" baseline="0" dirty="0" smtClean="0">
+                <a:ln>
+                  <a:noFill/>
+                </a:ln>
+                <a:solidFill>
+                  <a:srgbClr val="000000"/>
+                </a:solidFill>
+                <a:effectLst/>
+                <a:latin typeface="Consolas" panose="020B0609020204030204" pitchFamily="49" charset="0"/>
+                <a:cs typeface="Consolas" panose="020B0609020204030204" pitchFamily="49" charset="0"/>
+              </a:rPr>
+              <a:t> </a:t>
+            </a:r>
+            <a:r>
+              <a:rPr kumimoji="0" lang="pl-PL" altLang="pl-PL" sz="1200" b="0" i="0" u="none" strike="noStrike" cap="none" normalizeH="0" baseline="0" dirty="0" smtClean="0">
+                <a:ln>
+                  <a:noFill/>
+                </a:ln>
+                <a:solidFill>
+                  <a:srgbClr val="BB60D5"/>
+                </a:solidFill>
+                <a:effectLst/>
+                <a:latin typeface="Consolas" panose="020B0609020204030204" pitchFamily="49" charset="0"/>
+                <a:cs typeface="Consolas" panose="020B0609020204030204" pitchFamily="49" charset="0"/>
+              </a:rPr>
+              <a:t>X</a:t>
+            </a:r>
+            <a:r>
+              <a:rPr kumimoji="0" lang="pl-PL" altLang="pl-PL" sz="1200" b="0" i="0" u="none" strike="noStrike" cap="none" normalizeH="0" baseline="0" dirty="0" smtClean="0">
+                <a:ln>
+                  <a:noFill/>
+                </a:ln>
+                <a:solidFill>
+                  <a:srgbClr val="000000"/>
+                </a:solidFill>
+                <a:effectLst/>
+                <a:latin typeface="Consolas" panose="020B0609020204030204" pitchFamily="49" charset="0"/>
+                <a:cs typeface="Consolas" panose="020B0609020204030204" pitchFamily="49" charset="0"/>
+              </a:rPr>
+              <a:t> </a:t>
+            </a:r>
+            <a:r>
+              <a:rPr kumimoji="0" lang="pl-PL" altLang="pl-PL" sz="1200" b="1" i="0" u="none" strike="noStrike" cap="none" normalizeH="0" baseline="0" dirty="0" smtClean="0">
+                <a:ln>
+                  <a:noFill/>
+                </a:ln>
+                <a:solidFill>
+                  <a:srgbClr val="007020"/>
+                </a:solidFill>
+                <a:effectLst/>
+                <a:latin typeface="Consolas" panose="020B0609020204030204" pitchFamily="49" charset="0"/>
+                <a:cs typeface="Consolas" panose="020B0609020204030204" pitchFamily="49" charset="0"/>
+              </a:rPr>
+              <a:t>rem</a:t>
+            </a:r>
+            <a:r>
+              <a:rPr kumimoji="0" lang="pl-PL" altLang="pl-PL" sz="1200" b="0" i="0" u="none" strike="noStrike" cap="none" normalizeH="0" baseline="0" dirty="0" smtClean="0">
+                <a:ln>
+                  <a:noFill/>
+                </a:ln>
+                <a:solidFill>
+                  <a:srgbClr val="000000"/>
+                </a:solidFill>
+                <a:effectLst/>
+                <a:latin typeface="Consolas" panose="020B0609020204030204" pitchFamily="49" charset="0"/>
+                <a:cs typeface="Consolas" panose="020B0609020204030204" pitchFamily="49" charset="0"/>
+              </a:rPr>
+              <a:t> </a:t>
+            </a:r>
+            <a:r>
+              <a:rPr kumimoji="0" lang="pl-PL" altLang="pl-PL" sz="1200" b="0" i="0" u="none" strike="noStrike" cap="none" normalizeH="0" baseline="0" dirty="0" smtClean="0">
+                <a:ln>
+                  <a:noFill/>
+                </a:ln>
+                <a:solidFill>
+                  <a:srgbClr val="0000FF"/>
+                </a:solidFill>
+                <a:effectLst/>
+                <a:latin typeface="Consolas" panose="020B0609020204030204" pitchFamily="49" charset="0"/>
+                <a:cs typeface="Consolas" panose="020B0609020204030204" pitchFamily="49" charset="0"/>
+              </a:rPr>
+              <a:t>3</a:t>
+            </a:r>
+            <a:r>
+              <a:rPr kumimoji="0" lang="pl-PL" altLang="pl-PL" sz="1200" b="0" i="0" u="none" strike="noStrike" cap="none" normalizeH="0" baseline="0" dirty="0" smtClean="0">
+                <a:ln>
+                  <a:noFill/>
+                </a:ln>
+                <a:solidFill>
+                  <a:srgbClr val="000000"/>
+                </a:solidFill>
+                <a:effectLst/>
+                <a:latin typeface="Consolas" panose="020B0609020204030204" pitchFamily="49" charset="0"/>
+                <a:cs typeface="Consolas" panose="020B0609020204030204" pitchFamily="49" charset="0"/>
+              </a:rPr>
+              <a:t> </a:t>
+            </a:r>
+            <a:r>
+              <a:rPr kumimoji="0" lang="pl-PL" altLang="pl-PL" sz="1200" b="0" i="0" u="none" strike="noStrike" cap="none" normalizeH="0" baseline="0" dirty="0" smtClean="0">
+                <a:ln>
+                  <a:noFill/>
+                </a:ln>
+                <a:solidFill>
+                  <a:srgbClr val="666666"/>
+                </a:solidFill>
+                <a:effectLst/>
+                <a:latin typeface="Consolas" panose="020B0609020204030204" pitchFamily="49" charset="0"/>
+                <a:cs typeface="Consolas" panose="020B0609020204030204" pitchFamily="49" charset="0"/>
+              </a:rPr>
+              <a:t>==</a:t>
+            </a:r>
+            <a:r>
+              <a:rPr kumimoji="0" lang="pl-PL" altLang="pl-PL" sz="1200" b="0" i="0" u="none" strike="noStrike" cap="none" normalizeH="0" baseline="0" dirty="0" smtClean="0">
+                <a:ln>
+                  <a:noFill/>
+                </a:ln>
+                <a:solidFill>
+                  <a:srgbClr val="000000"/>
+                </a:solidFill>
+                <a:effectLst/>
+                <a:latin typeface="Consolas" panose="020B0609020204030204" pitchFamily="49" charset="0"/>
+                <a:cs typeface="Consolas" panose="020B0609020204030204" pitchFamily="49" charset="0"/>
+              </a:rPr>
+              <a:t> </a:t>
+            </a:r>
+            <a:r>
+              <a:rPr kumimoji="0" lang="pl-PL" altLang="pl-PL" sz="1200" b="0" i="0" u="none" strike="noStrike" cap="none" normalizeH="0" baseline="0" dirty="0" smtClean="0">
+                <a:ln>
+                  <a:noFill/>
+                </a:ln>
+                <a:solidFill>
+                  <a:srgbClr val="0000FF"/>
+                </a:solidFill>
+                <a:effectLst/>
+                <a:latin typeface="Consolas" panose="020B0609020204030204" pitchFamily="49" charset="0"/>
+                <a:cs typeface="Consolas" panose="020B0609020204030204" pitchFamily="49" charset="0"/>
+              </a:rPr>
+              <a:t>0</a:t>
+            </a:r>
+            <a:r>
+              <a:rPr kumimoji="0" lang="pl-PL" altLang="pl-PL" sz="1200" b="0" i="0" u="none" strike="noStrike" cap="none" normalizeH="0" baseline="0" dirty="0" smtClean="0">
+                <a:ln>
+                  <a:noFill/>
+                </a:ln>
+                <a:solidFill>
+                  <a:srgbClr val="000000"/>
+                </a:solidFill>
+                <a:effectLst/>
+                <a:latin typeface="Consolas" panose="020B0609020204030204" pitchFamily="49" charset="0"/>
+                <a:cs typeface="Consolas" panose="020B0609020204030204" pitchFamily="49" charset="0"/>
+              </a:rPr>
+              <a:t> </a:t>
+            </a:r>
+            <a:r>
+              <a:rPr kumimoji="0" lang="pl-PL" altLang="pl-PL" sz="1200" b="1" i="0" u="none" strike="noStrike" cap="none" normalizeH="0" baseline="0" dirty="0" smtClean="0">
+                <a:ln>
+                  <a:noFill/>
+                </a:ln>
+                <a:solidFill>
+                  <a:srgbClr val="000080"/>
+                </a:solidFill>
+                <a:effectLst/>
+                <a:latin typeface="Consolas" panose="020B0609020204030204" pitchFamily="49" charset="0"/>
+                <a:cs typeface="Consolas" panose="020B0609020204030204" pitchFamily="49" charset="0"/>
+              </a:rPr>
+              <a:t>end</a:t>
+            </a:r>
+            <a:r>
+              <a:rPr kumimoji="0" lang="pl-PL" altLang="pl-PL" sz="1200" b="0" i="0" u="none" strike="noStrike" cap="none" normalizeH="0" baseline="0" dirty="0" smtClean="0">
+                <a:ln>
+                  <a:noFill/>
+                </a:ln>
+                <a:solidFill>
+                  <a:srgbClr val="000000"/>
+                </a:solidFill>
+                <a:effectLst/>
+                <a:latin typeface="Consolas" panose="020B0609020204030204" pitchFamily="49" charset="0"/>
+                <a:cs typeface="Consolas" panose="020B0609020204030204" pitchFamily="49" charset="0"/>
+              </a:rPr>
+              <a:t>, </a:t>
+            </a:r>
+            <a:r>
+              <a:rPr kumimoji="0" lang="pl-PL" altLang="pl-PL" sz="1200" b="1" i="0" u="none" strike="noStrike" cap="none" normalizeH="0" baseline="0" dirty="0" smtClean="0">
+                <a:ln>
+                  <a:noFill/>
+                </a:ln>
+                <a:solidFill>
+                  <a:srgbClr val="0E84B5"/>
+                </a:solidFill>
+                <a:effectLst/>
+                <a:latin typeface="Consolas" panose="020B0609020204030204" pitchFamily="49" charset="0"/>
+                <a:cs typeface="Consolas" panose="020B0609020204030204" pitchFamily="49" charset="0"/>
+              </a:rPr>
+              <a:t>lists</a:t>
+            </a:r>
+            <a:r>
+              <a:rPr kumimoji="0" lang="pl-PL" altLang="pl-PL" sz="1200" b="0" i="0" u="none" strike="noStrike" cap="none" normalizeH="0" baseline="0" dirty="0" smtClean="0">
+                <a:ln>
+                  <a:noFill/>
+                </a:ln>
+                <a:solidFill>
+                  <a:srgbClr val="000000"/>
+                </a:solidFill>
+                <a:effectLst/>
+                <a:latin typeface="Consolas" panose="020B0609020204030204" pitchFamily="49" charset="0"/>
+                <a:cs typeface="Consolas" panose="020B0609020204030204" pitchFamily="49" charset="0"/>
+              </a:rPr>
+              <a:t>:</a:t>
+            </a:r>
+            <a:r>
+              <a:rPr kumimoji="0" lang="pl-PL" altLang="pl-PL" sz="1200" b="0" i="0" u="none" strike="noStrike" cap="none" normalizeH="0" baseline="0" dirty="0" smtClean="0">
+                <a:ln>
+                  <a:noFill/>
+                </a:ln>
+                <a:solidFill>
+                  <a:srgbClr val="06287E"/>
+                </a:solidFill>
+                <a:effectLst/>
+                <a:latin typeface="Consolas" panose="020B0609020204030204" pitchFamily="49" charset="0"/>
+                <a:cs typeface="Consolas" panose="020B0609020204030204" pitchFamily="49" charset="0"/>
+              </a:rPr>
+              <a:t>seq</a:t>
+            </a:r>
+            <a:r>
+              <a:rPr kumimoji="0" lang="pl-PL" altLang="pl-PL" sz="1200" b="0" i="0" u="none" strike="noStrike" cap="none" normalizeH="0" baseline="0" dirty="0" smtClean="0">
+                <a:ln>
+                  <a:noFill/>
+                </a:ln>
+                <a:solidFill>
+                  <a:srgbClr val="000000"/>
+                </a:solidFill>
+                <a:effectLst/>
+                <a:latin typeface="Consolas" panose="020B0609020204030204" pitchFamily="49" charset="0"/>
+                <a:cs typeface="Consolas" panose="020B0609020204030204" pitchFamily="49" charset="0"/>
+              </a:rPr>
+              <a:t>(</a:t>
+            </a:r>
+            <a:r>
+              <a:rPr kumimoji="0" lang="pl-PL" altLang="pl-PL" sz="1200" b="0" i="0" u="none" strike="noStrike" cap="none" normalizeH="0" baseline="0" dirty="0" smtClean="0">
+                <a:ln>
+                  <a:noFill/>
+                </a:ln>
+                <a:solidFill>
+                  <a:srgbClr val="0000FF"/>
+                </a:solidFill>
+                <a:effectLst/>
+                <a:latin typeface="Consolas" panose="020B0609020204030204" pitchFamily="49" charset="0"/>
+                <a:cs typeface="Consolas" panose="020B0609020204030204" pitchFamily="49" charset="0"/>
+              </a:rPr>
+              <a:t>1</a:t>
+            </a:r>
+            <a:r>
+              <a:rPr kumimoji="0" lang="pl-PL" altLang="pl-PL" sz="1200" b="0" i="0" u="none" strike="noStrike" cap="none" normalizeH="0" baseline="0" dirty="0" smtClean="0">
+                <a:ln>
+                  <a:noFill/>
+                </a:ln>
+                <a:solidFill>
+                  <a:srgbClr val="000000"/>
+                </a:solidFill>
+                <a:effectLst/>
+                <a:latin typeface="Consolas" panose="020B0609020204030204" pitchFamily="49" charset="0"/>
+                <a:cs typeface="Consolas" panose="020B0609020204030204" pitchFamily="49" charset="0"/>
+              </a:rPr>
+              <a:t>, </a:t>
+            </a:r>
+            <a:r>
+              <a:rPr kumimoji="0" lang="pl-PL" altLang="pl-PL" sz="1200" b="0" i="0" u="none" strike="noStrike" cap="none" normalizeH="0" baseline="0" dirty="0" smtClean="0">
+                <a:ln>
+                  <a:noFill/>
+                </a:ln>
+                <a:solidFill>
+                  <a:srgbClr val="0000FF"/>
+                </a:solidFill>
+                <a:effectLst/>
+                <a:latin typeface="Consolas" panose="020B0609020204030204" pitchFamily="49" charset="0"/>
+                <a:cs typeface="Consolas" panose="020B0609020204030204" pitchFamily="49" charset="0"/>
+              </a:rPr>
+              <a:t>1000000</a:t>
+            </a:r>
+            <a:r>
+              <a:rPr kumimoji="0" lang="pl-PL" altLang="pl-PL" sz="1200" b="0" i="0" u="none" strike="noStrike" cap="none" normalizeH="0" baseline="0" dirty="0" smtClean="0">
+                <a:ln>
+                  <a:noFill/>
+                </a:ln>
+                <a:solidFill>
+                  <a:srgbClr val="000000"/>
+                </a:solidFill>
+                <a:effectLst/>
+                <a:latin typeface="Consolas" panose="020B0609020204030204" pitchFamily="49" charset="0"/>
+                <a:cs typeface="Consolas" panose="020B0609020204030204" pitchFamily="49" charset="0"/>
+              </a:rPr>
+              <a:t>) ]). </a:t>
+            </a:r>
+          </a:p>
+          <a:p>
+            <a:pPr marL="0" marR="0" lvl="0" indent="0" algn="l" defTabSz="914400" rtl="0" eaLnBrk="0" fontAlgn="base" latinLnBrk="0" hangingPunct="0">
+              <a:lnSpc>
+                <a:spcPct val="100000"/>
+              </a:lnSpc>
+              <a:spcBef>
+                <a:spcPct val="0"/>
+              </a:spcBef>
+              <a:spcAft>
+                <a:spcPct val="0"/>
+              </a:spcAft>
+              <a:buClrTx/>
+              <a:buSzTx/>
+              <a:buFontTx/>
+              <a:buNone/>
+              <a:tabLst/>
+            </a:pPr>
+            <a:r>
+              <a:rPr kumimoji="0" lang="pl-PL" altLang="pl-PL" sz="1200" b="0" i="0" u="none" strike="noStrike" cap="none" normalizeH="0" baseline="0" dirty="0" smtClean="0">
+                <a:ln>
+                  <a:noFill/>
+                </a:ln>
+                <a:solidFill>
+                  <a:srgbClr val="888888"/>
+                </a:solidFill>
+                <a:effectLst/>
+                <a:latin typeface="Consolas" panose="020B0609020204030204" pitchFamily="49" charset="0"/>
+                <a:cs typeface="Consolas" panose="020B0609020204030204" pitchFamily="49" charset="0"/>
+              </a:rPr>
+              <a:t>{3108780,[...]}</a:t>
+            </a:r>
+            <a:endParaRPr kumimoji="0" lang="pl-PL" altLang="pl-PL" sz="1200" b="0" i="0" u="none" strike="noStrike" cap="none" normalizeH="0" baseline="0" dirty="0" smtClean="0">
+              <a:ln>
+                <a:noFill/>
+              </a:ln>
+              <a:solidFill>
+                <a:schemeClr val="tx1"/>
+              </a:solidFill>
+              <a:effectLst/>
+              <a:latin typeface="Consolas" panose="020B0609020204030204" pitchFamily="49" charset="0"/>
+              <a:cs typeface="Consolas" panose="020B0609020204030204" pitchFamily="49" charset="0"/>
+            </a:endParaRPr>
+          </a:p>
+        </p:txBody>
+      </p:sp>
     </p:spTree>
   </p:cSld>
   <p:clrMapOvr>

</xml_diff>